<commit_message>
learning_python, presentation 21: Specified print instead of single letter variable to print while in pdb
</commit_message>
<xml_diff>
--- a/python/presentations/learning_python/21_ceda-log-pdb.pptx
+++ b/python/presentations/learning_python/21_ceda-log-pdb.pptx
@@ -689,7 +689,7 @@
               <a:pPr>
                 <a:defRPr/>
               </a:pPr>
-              <a:t>09/10/2018</a:t>
+              <a:t>18/12/2018</a:t>
             </a:fld>
             <a:endParaRPr lang="en-GB"/>
           </a:p>
@@ -926,7 +926,7 @@
               <a:pPr>
                 <a:defRPr/>
               </a:pPr>
-              <a:t>09/10/2018</a:t>
+              <a:t>18/12/2018</a:t>
             </a:fld>
             <a:endParaRPr lang="en-GB"/>
           </a:p>
@@ -1647,7 +1647,7 @@
               <a:pPr>
                 <a:defRPr/>
               </a:pPr>
-              <a:t>09/10/2018</a:t>
+              <a:t>18/12/2018</a:t>
             </a:fld>
             <a:endParaRPr lang="en-GB"/>
           </a:p>
@@ -3138,14 +3138,21 @@
                 <a:latin typeface="Courier New" panose="02070309020205020404" pitchFamily="49" charset="0"/>
                 <a:cs typeface="Courier New" panose="02070309020205020404" pitchFamily="49" charset="0"/>
               </a:rPr>
-              <a:t>x</a:t>
+              <a:t>print(x)</a:t>
             </a:r>
             <a:r>
               <a:rPr lang="en-GB" altLang="en-US" sz="2400" b="1" dirty="0" smtClean="0">
                 <a:latin typeface="Courier New" panose="02070309020205020404" pitchFamily="49" charset="0"/>
                 <a:cs typeface="Courier New" panose="02070309020205020404" pitchFamily="49" charset="0"/>
               </a:rPr>
-              <a:t>       	</a:t>
+              <a:t>       </a:t>
+            </a:r>
+            <a:r>
+              <a:rPr lang="en-GB" altLang="en-US" sz="2400" b="1" dirty="0" smtClean="0">
+                <a:latin typeface="Courier New" panose="02070309020205020404" pitchFamily="49" charset="0"/>
+                <a:cs typeface="Courier New" panose="02070309020205020404" pitchFamily="49" charset="0"/>
+              </a:rPr>
+              <a:t>	</a:t>
             </a:r>
             <a:r>
               <a:rPr lang="en-GB" altLang="en-US" sz="2400" b="1" dirty="0" smtClean="0">
@@ -6242,21 +6249,21 @@
               <a:buNone/>
             </a:pPr>
             <a:r>
-              <a:rPr lang="en-GB" altLang="en-US" sz="1800" b="1" smtClean="0">
+              <a:rPr lang="en-GB" altLang="en-US" sz="1800" b="1" dirty="0" smtClean="0">
                 <a:latin typeface="Courier New" panose="02070309020205020404" pitchFamily="49" charset="0"/>
                 <a:cs typeface="Courier New" panose="02070309020205020404" pitchFamily="49" charset="0"/>
               </a:rPr>
               <a:t>$</a:t>
             </a:r>
             <a:r>
-              <a:rPr lang="en-GB" altLang="en-US" sz="1800" smtClean="0">
+              <a:rPr lang="en-GB" altLang="en-US" sz="1800" dirty="0" smtClean="0">
                 <a:latin typeface="Courier New" panose="02070309020205020404" pitchFamily="49" charset="0"/>
                 <a:cs typeface="Courier New" panose="02070309020205020404" pitchFamily="49" charset="0"/>
               </a:rPr>
               <a:t> </a:t>
             </a:r>
             <a:r>
-              <a:rPr lang="en-GB" altLang="en-US" sz="1800" smtClean="0">
+              <a:rPr lang="en-GB" altLang="en-US" sz="1800" dirty="0" smtClean="0">
                 <a:solidFill>
                   <a:srgbClr val="008000"/>
                 </a:solidFill>
@@ -6272,18 +6279,32 @@
               <a:buNone/>
             </a:pPr>
             <a:r>
-              <a:rPr lang="en-US" altLang="en-US" sz="1800" b="1" i="1" smtClean="0">
+              <a:rPr lang="en-US" altLang="en-US" sz="1800" b="1" i="1" dirty="0" smtClean="0">
                 <a:latin typeface="Courier New" panose="02070309020205020404" pitchFamily="49" charset="0"/>
                 <a:cs typeface="Courier New" panose="02070309020205020404" pitchFamily="49" charset="0"/>
               </a:rPr>
               <a:t>&gt;</a:t>
             </a:r>
             <a:r>
-              <a:rPr lang="en-US" altLang="en-US" sz="1800" i="1" smtClean="0">
-                <a:latin typeface="Courier New" panose="02070309020205020404" pitchFamily="49" charset="0"/>
-                <a:cs typeface="Courier New" panose="02070309020205020404" pitchFamily="49" charset="0"/>
-              </a:rPr>
-              <a:t> /home/vagrant/double.py(5)double_it()</a:t>
+              <a:rPr lang="en-US" altLang="en-US" sz="1800" i="1" dirty="0" smtClean="0">
+                <a:latin typeface="Courier New" panose="02070309020205020404" pitchFamily="49" charset="0"/>
+                <a:cs typeface="Courier New" panose="02070309020205020404" pitchFamily="49" charset="0"/>
+              </a:rPr>
+              <a:t> /home/vagrant/double.py(5)</a:t>
+            </a:r>
+            <a:r>
+              <a:rPr lang="en-US" altLang="en-US" sz="1800" i="1" dirty="0" err="1" smtClean="0">
+                <a:latin typeface="Courier New" panose="02070309020205020404" pitchFamily="49" charset="0"/>
+                <a:cs typeface="Courier New" panose="02070309020205020404" pitchFamily="49" charset="0"/>
+              </a:rPr>
+              <a:t>double_it</a:t>
+            </a:r>
+            <a:r>
+              <a:rPr lang="en-US" altLang="en-US" sz="1800" i="1" dirty="0" smtClean="0">
+                <a:latin typeface="Courier New" panose="02070309020205020404" pitchFamily="49" charset="0"/>
+                <a:cs typeface="Courier New" panose="02070309020205020404" pitchFamily="49" charset="0"/>
+              </a:rPr>
+              <a:t>()</a:t>
             </a:r>
           </a:p>
           <a:p>
@@ -6292,14 +6313,14 @@
               <a:buNone/>
             </a:pPr>
             <a:r>
-              <a:rPr lang="en-US" altLang="en-US" sz="1800" b="1" i="1" smtClean="0">
+              <a:rPr lang="en-US" altLang="en-US" sz="1800" b="1" i="1" dirty="0" smtClean="0">
                 <a:latin typeface="Courier New" panose="02070309020205020404" pitchFamily="49" charset="0"/>
                 <a:cs typeface="Courier New" panose="02070309020205020404" pitchFamily="49" charset="0"/>
               </a:rPr>
               <a:t>-&gt;</a:t>
             </a:r>
             <a:r>
-              <a:rPr lang="en-US" altLang="en-US" sz="1800" i="1" smtClean="0">
+              <a:rPr lang="en-US" altLang="en-US" sz="1800" i="1" dirty="0" smtClean="0">
                 <a:latin typeface="Courier New" panose="02070309020205020404" pitchFamily="49" charset="0"/>
                 <a:cs typeface="Courier New" panose="02070309020205020404" pitchFamily="49" charset="0"/>
               </a:rPr>
@@ -6312,14 +6333,28 @@
               <a:buNone/>
             </a:pPr>
             <a:r>
-              <a:rPr lang="en-US" altLang="en-US" sz="1800" b="1" smtClean="0">
-                <a:latin typeface="Courier New" panose="02070309020205020404" pitchFamily="49" charset="0"/>
-                <a:cs typeface="Courier New" panose="02070309020205020404" pitchFamily="49" charset="0"/>
-              </a:rPr>
-              <a:t>(Pdb) </a:t>
-            </a:r>
-            <a:r>
-              <a:rPr lang="en-US" altLang="en-US" sz="1800" smtClean="0">
+              <a:rPr lang="en-US" altLang="en-US" sz="1800" b="1" dirty="0" smtClean="0">
+                <a:latin typeface="Courier New" panose="02070309020205020404" pitchFamily="49" charset="0"/>
+                <a:cs typeface="Courier New" panose="02070309020205020404" pitchFamily="49" charset="0"/>
+              </a:rPr>
+              <a:t>(</a:t>
+            </a:r>
+            <a:r>
+              <a:rPr lang="en-US" altLang="en-US" sz="1800" b="1" dirty="0" err="1" smtClean="0">
+                <a:latin typeface="Courier New" panose="02070309020205020404" pitchFamily="49" charset="0"/>
+                <a:cs typeface="Courier New" panose="02070309020205020404" pitchFamily="49" charset="0"/>
+              </a:rPr>
+              <a:t>Pdb</a:t>
+            </a:r>
+            <a:r>
+              <a:rPr lang="en-US" altLang="en-US" sz="1800" b="1" dirty="0" smtClean="0">
+                <a:latin typeface="Courier New" panose="02070309020205020404" pitchFamily="49" charset="0"/>
+                <a:cs typeface="Courier New" panose="02070309020205020404" pitchFamily="49" charset="0"/>
+              </a:rPr>
+              <a:t>) </a:t>
+            </a:r>
+            <a:r>
+              <a:rPr lang="en-US" altLang="en-US" sz="1800" dirty="0" smtClean="0">
                 <a:solidFill>
                   <a:srgbClr val="008000"/>
                 </a:solidFill>
@@ -6329,7 +6364,7 @@
               <a:t>n</a:t>
             </a:r>
             <a:r>
-              <a:rPr lang="en-GB" altLang="en-US" sz="1800" b="1" smtClean="0">
+              <a:rPr lang="en-GB" altLang="en-US" sz="1800" b="1" dirty="0" smtClean="0">
                 <a:solidFill>
                   <a:srgbClr val="008000"/>
                 </a:solidFill>
@@ -6339,19 +6374,19 @@
               <a:t>  </a:t>
             </a:r>
             <a:r>
-              <a:rPr lang="en-GB" altLang="en-US" sz="1800" b="1" smtClean="0">
+              <a:rPr lang="en-GB" altLang="en-US" sz="1800" b="1" dirty="0" smtClean="0">
                 <a:latin typeface="Courier New" panose="02070309020205020404" pitchFamily="49" charset="0"/>
                 <a:cs typeface="Courier New" panose="02070309020205020404" pitchFamily="49" charset="0"/>
               </a:rPr>
               <a:t>   		</a:t>
             </a:r>
             <a:r>
-              <a:rPr lang="en-GB" altLang="en-US" sz="2000" b="1" smtClean="0">
+              <a:rPr lang="en-GB" altLang="en-US" sz="2000" b="1" dirty="0" smtClean="0">
                 <a:cs typeface="Courier New" panose="02070309020205020404" pitchFamily="49" charset="0"/>
               </a:rPr>
               <a:t>Run the next line of code</a:t>
             </a:r>
-            <a:endParaRPr lang="en-GB" altLang="en-US" sz="1800" b="1" smtClean="0">
+            <a:endParaRPr lang="en-GB" altLang="en-US" sz="1800" b="1" dirty="0" smtClean="0">
               <a:cs typeface="Courier New" panose="02070309020205020404" pitchFamily="49" charset="0"/>
             </a:endParaRPr>
           </a:p>
@@ -6361,32 +6396,60 @@
               <a:buNone/>
             </a:pPr>
             <a:r>
-              <a:rPr lang="en-GB" altLang="en-US" sz="1800" b="1" i="1" smtClean="0">
+              <a:rPr lang="en-GB" altLang="en-US" sz="1800" b="1" i="1" dirty="0" smtClean="0">
                 <a:latin typeface="Courier New" panose="02070309020205020404" pitchFamily="49" charset="0"/>
                 <a:cs typeface="Courier New" panose="02070309020205020404" pitchFamily="49" charset="0"/>
               </a:rPr>
               <a:t>&gt;</a:t>
             </a:r>
             <a:r>
-              <a:rPr lang="en-GB" altLang="en-US" sz="1800" i="1" smtClean="0">
+              <a:rPr lang="en-GB" altLang="en-US" sz="1800" i="1" dirty="0" smtClean="0">
                 <a:latin typeface="Courier New" panose="02070309020205020404" pitchFamily="49" charset="0"/>
                 <a:cs typeface="Courier New" panose="02070309020205020404" pitchFamily="49" charset="0"/>
               </a:rPr>
               <a:t> /home/vagrant/</a:t>
             </a:r>
             <a:r>
-              <a:rPr lang="en-US" altLang="en-US" sz="1800" i="1" smtClean="0">
+              <a:rPr lang="en-US" altLang="en-US" sz="1800" i="1" dirty="0" smtClean="0">
                 <a:latin typeface="Courier New" panose="02070309020205020404" pitchFamily="49" charset="0"/>
                 <a:cs typeface="Courier New" panose="02070309020205020404" pitchFamily="49" charset="0"/>
               </a:rPr>
               <a:t>double</a:t>
             </a:r>
             <a:r>
-              <a:rPr lang="en-GB" altLang="en-US" sz="1800" i="1" smtClean="0">
-                <a:latin typeface="Courier New" panose="02070309020205020404" pitchFamily="49" charset="0"/>
-                <a:cs typeface="Courier New" panose="02070309020205020404" pitchFamily="49" charset="0"/>
-              </a:rPr>
-              <a:t>.py(6)double_it()</a:t>
+              <a:rPr lang="en-GB" altLang="en-US" sz="1800" i="1" dirty="0" smtClean="0">
+                <a:latin typeface="Courier New" panose="02070309020205020404" pitchFamily="49" charset="0"/>
+                <a:cs typeface="Courier New" panose="02070309020205020404" pitchFamily="49" charset="0"/>
+              </a:rPr>
+              <a:t>.</a:t>
+            </a:r>
+            <a:r>
+              <a:rPr lang="en-GB" altLang="en-US" sz="1800" i="1" dirty="0" err="1" smtClean="0">
+                <a:latin typeface="Courier New" panose="02070309020205020404" pitchFamily="49" charset="0"/>
+                <a:cs typeface="Courier New" panose="02070309020205020404" pitchFamily="49" charset="0"/>
+              </a:rPr>
+              <a:t>py</a:t>
+            </a:r>
+            <a:r>
+              <a:rPr lang="en-GB" altLang="en-US" sz="1800" i="1" dirty="0" smtClean="0">
+                <a:latin typeface="Courier New" panose="02070309020205020404" pitchFamily="49" charset="0"/>
+                <a:cs typeface="Courier New" panose="02070309020205020404" pitchFamily="49" charset="0"/>
+              </a:rPr>
+              <a:t>(6)</a:t>
+            </a:r>
+            <a:r>
+              <a:rPr lang="en-GB" altLang="en-US" sz="1800" i="1" dirty="0" err="1" smtClean="0">
+                <a:latin typeface="Courier New" panose="02070309020205020404" pitchFamily="49" charset="0"/>
+                <a:cs typeface="Courier New" panose="02070309020205020404" pitchFamily="49" charset="0"/>
+              </a:rPr>
+              <a:t>double_it</a:t>
+            </a:r>
+            <a:r>
+              <a:rPr lang="en-GB" altLang="en-US" sz="1800" i="1" dirty="0" smtClean="0">
+                <a:latin typeface="Courier New" panose="02070309020205020404" pitchFamily="49" charset="0"/>
+                <a:cs typeface="Courier New" panose="02070309020205020404" pitchFamily="49" charset="0"/>
+              </a:rPr>
+              <a:t>()</a:t>
             </a:r>
           </a:p>
           <a:p>
@@ -6395,14 +6458,14 @@
               <a:buNone/>
             </a:pPr>
             <a:r>
-              <a:rPr lang="en-GB" altLang="en-US" sz="1800" b="1" i="1" smtClean="0">
+              <a:rPr lang="en-GB" altLang="en-US" sz="1800" b="1" i="1" dirty="0" smtClean="0">
                 <a:latin typeface="Courier New" panose="02070309020205020404" pitchFamily="49" charset="0"/>
                 <a:cs typeface="Courier New" panose="02070309020205020404" pitchFamily="49" charset="0"/>
               </a:rPr>
               <a:t>-&gt;</a:t>
             </a:r>
             <a:r>
-              <a:rPr lang="en-GB" altLang="en-US" sz="1800" i="1" smtClean="0">
+              <a:rPr lang="en-GB" altLang="en-US" sz="1800" i="1" dirty="0" smtClean="0">
                 <a:latin typeface="Courier New" panose="02070309020205020404" pitchFamily="49" charset="0"/>
                 <a:cs typeface="Courier New" panose="02070309020205020404" pitchFamily="49" charset="0"/>
               </a:rPr>
@@ -6415,31 +6478,65 @@
               <a:buNone/>
             </a:pPr>
             <a:r>
-              <a:rPr lang="en-GB" altLang="en-US" sz="1800" b="1" smtClean="0">
-                <a:latin typeface="Courier New" panose="02070309020205020404" pitchFamily="49" charset="0"/>
-                <a:cs typeface="Courier New" panose="02070309020205020404" pitchFamily="49" charset="0"/>
-              </a:rPr>
-              <a:t>(Pdb) </a:t>
-            </a:r>
-            <a:r>
-              <a:rPr lang="en-GB" altLang="en-US" sz="1800" smtClean="0">
+              <a:rPr lang="en-GB" altLang="en-US" sz="1800" b="1" dirty="0" smtClean="0">
+                <a:latin typeface="Courier New" panose="02070309020205020404" pitchFamily="49" charset="0"/>
+                <a:cs typeface="Courier New" panose="02070309020205020404" pitchFamily="49" charset="0"/>
+              </a:rPr>
+              <a:t>(</a:t>
+            </a:r>
+            <a:r>
+              <a:rPr lang="en-GB" altLang="en-US" sz="1800" b="1" dirty="0" err="1" smtClean="0">
+                <a:latin typeface="Courier New" panose="02070309020205020404" pitchFamily="49" charset="0"/>
+                <a:cs typeface="Courier New" panose="02070309020205020404" pitchFamily="49" charset="0"/>
+              </a:rPr>
+              <a:t>Pdb</a:t>
+            </a:r>
+            <a:r>
+              <a:rPr lang="en-GB" altLang="en-US" sz="1800" b="1" dirty="0" smtClean="0">
+                <a:latin typeface="Courier New" panose="02070309020205020404" pitchFamily="49" charset="0"/>
+                <a:cs typeface="Courier New" panose="02070309020205020404" pitchFamily="49" charset="0"/>
+              </a:rPr>
+              <a:t>) </a:t>
+            </a:r>
+            <a:r>
+              <a:rPr lang="en-GB" altLang="en-US" sz="1800" dirty="0" smtClean="0">
                 <a:solidFill>
                   <a:srgbClr val="008000"/>
                 </a:solidFill>
                 <a:latin typeface="Courier New" panose="02070309020205020404" pitchFamily="49" charset="0"/>
                 <a:cs typeface="Courier New" panose="02070309020205020404" pitchFamily="49" charset="0"/>
               </a:rPr>
-              <a:t>double, x   </a:t>
-            </a:r>
-            <a:r>
-              <a:rPr lang="en-GB" altLang="en-US" sz="1800" smtClean="0">
+              <a:t>print(double</a:t>
+            </a:r>
+            <a:r>
+              <a:rPr lang="en-GB" altLang="en-US" sz="1800" dirty="0" smtClean="0">
+                <a:solidFill>
+                  <a:srgbClr val="008000"/>
+                </a:solidFill>
+                <a:latin typeface="Courier New" panose="02070309020205020404" pitchFamily="49" charset="0"/>
+                <a:cs typeface="Courier New" panose="02070309020205020404" pitchFamily="49" charset="0"/>
+              </a:rPr>
+              <a:t>, </a:t>
+            </a:r>
+            <a:r>
+              <a:rPr lang="en-GB" altLang="en-US" sz="1800" dirty="0" smtClean="0">
+                <a:solidFill>
+                  <a:srgbClr val="008000"/>
+                </a:solidFill>
+                <a:latin typeface="Courier New" panose="02070309020205020404" pitchFamily="49" charset="0"/>
+                <a:cs typeface="Courier New" panose="02070309020205020404" pitchFamily="49" charset="0"/>
+              </a:rPr>
+              <a:t>x)   </a:t>
+            </a:r>
+            <a:r>
+              <a:rPr lang="en-GB" altLang="en-US" sz="1800" dirty="0" smtClean="0">
                 <a:latin typeface="Courier New" panose="02070309020205020404" pitchFamily="49" charset="0"/>
                 <a:cs typeface="Courier New" panose="02070309020205020404" pitchFamily="49" charset="0"/>
               </a:rPr>
               <a:t>	</a:t>
             </a:r>
             <a:r>
-              <a:rPr lang="en-GB" altLang="en-US" sz="2000" b="1" smtClean="0">
+              <a:rPr lang="en-GB" altLang="en-US" sz="2000" b="1" dirty="0" smtClean="0">
                 <a:cs typeface="Courier New" panose="02070309020205020404" pitchFamily="49" charset="0"/>
               </a:rPr>
               <a:t>Display current values of double and x</a:t>
@@ -6451,19 +6548,13 @@
               <a:buNone/>
             </a:pPr>
             <a:r>
-              <a:rPr lang="en-GB" altLang="en-US" sz="1800" i="1" smtClean="0">
-                <a:latin typeface="Courier New" panose="02070309020205020404" pitchFamily="49" charset="0"/>
-                <a:cs typeface="Courier New" panose="02070309020205020404" pitchFamily="49" charset="0"/>
-              </a:rPr>
-              <a:t>(68, 34)</a:t>
-            </a:r>
-          </a:p>
-          <a:p>
-            <a:pPr eaLnBrk="1" hangingPunct="1">
-              <a:buFont typeface="Arial" panose="020B0604020202020204" pitchFamily="34" charset="0"/>
-              <a:buNone/>
-            </a:pPr>
-            <a:endParaRPr lang="en-GB" altLang="en-US" sz="900" smtClean="0">
+              <a:rPr lang="en-GB" altLang="en-US" sz="1800" i="1" dirty="0" smtClean="0">
+                <a:latin typeface="Courier New" panose="02070309020205020404" pitchFamily="49" charset="0"/>
+                <a:cs typeface="Courier New" panose="02070309020205020404" pitchFamily="49" charset="0"/>
+              </a:rPr>
+              <a:t>68 34</a:t>
+            </a:r>
+            <a:endParaRPr lang="en-GB" altLang="en-US" sz="1800" i="1" dirty="0" smtClean="0">
               <a:latin typeface="Courier New" panose="02070309020205020404" pitchFamily="49" charset="0"/>
               <a:cs typeface="Courier New" panose="02070309020205020404" pitchFamily="49" charset="0"/>
             </a:endParaRPr>
@@ -6473,15 +6564,39 @@
               <a:buFont typeface="Arial" panose="020B0604020202020204" pitchFamily="34" charset="0"/>
               <a:buNone/>
             </a:pPr>
-            <a:r>
-              <a:rPr lang="en-GB" altLang="en-US" sz="1800" b="1" smtClean="0">
-                <a:latin typeface="Courier New" panose="02070309020205020404" pitchFamily="49" charset="0"/>
-                <a:cs typeface="Courier New" panose="02070309020205020404" pitchFamily="49" charset="0"/>
-              </a:rPr>
-              <a:t>(Pdb) </a:t>
-            </a:r>
-            <a:r>
-              <a:rPr lang="en-GB" altLang="en-US" sz="1800" smtClean="0">
+            <a:endParaRPr lang="en-GB" altLang="en-US" sz="900" dirty="0" smtClean="0">
+              <a:latin typeface="Courier New" panose="02070309020205020404" pitchFamily="49" charset="0"/>
+              <a:cs typeface="Courier New" panose="02070309020205020404" pitchFamily="49" charset="0"/>
+            </a:endParaRPr>
+          </a:p>
+          <a:p>
+            <a:pPr eaLnBrk="1" hangingPunct="1">
+              <a:buFont typeface="Arial" panose="020B0604020202020204" pitchFamily="34" charset="0"/>
+              <a:buNone/>
+            </a:pPr>
+            <a:r>
+              <a:rPr lang="en-GB" altLang="en-US" sz="1800" b="1" dirty="0" smtClean="0">
+                <a:latin typeface="Courier New" panose="02070309020205020404" pitchFamily="49" charset="0"/>
+                <a:cs typeface="Courier New" panose="02070309020205020404" pitchFamily="49" charset="0"/>
+              </a:rPr>
+              <a:t>(</a:t>
+            </a:r>
+            <a:r>
+              <a:rPr lang="en-GB" altLang="en-US" sz="1800" b="1" dirty="0" err="1" smtClean="0">
+                <a:latin typeface="Courier New" panose="02070309020205020404" pitchFamily="49" charset="0"/>
+                <a:cs typeface="Courier New" panose="02070309020205020404" pitchFamily="49" charset="0"/>
+              </a:rPr>
+              <a:t>Pdb</a:t>
+            </a:r>
+            <a:r>
+              <a:rPr lang="en-GB" altLang="en-US" sz="1800" b="1" dirty="0" smtClean="0">
+                <a:latin typeface="Courier New" panose="02070309020205020404" pitchFamily="49" charset="0"/>
+                <a:cs typeface="Courier New" panose="02070309020205020404" pitchFamily="49" charset="0"/>
+              </a:rPr>
+              <a:t>) </a:t>
+            </a:r>
+            <a:r>
+              <a:rPr lang="en-GB" altLang="en-US" sz="1800" dirty="0" smtClean="0">
                 <a:solidFill>
                   <a:srgbClr val="008000"/>
                 </a:solidFill>
@@ -6491,14 +6606,14 @@
               <a:t>n </a:t>
             </a:r>
             <a:r>
-              <a:rPr lang="en-GB" altLang="en-US" sz="1800" smtClean="0">
+              <a:rPr lang="en-GB" altLang="en-US" sz="1800" dirty="0" smtClean="0">
                 <a:latin typeface="Courier New" panose="02070309020205020404" pitchFamily="49" charset="0"/>
                 <a:cs typeface="Courier New" panose="02070309020205020404" pitchFamily="49" charset="0"/>
               </a:rPr>
               <a:t>    		</a:t>
             </a:r>
             <a:r>
-              <a:rPr lang="en-GB" altLang="en-US" sz="2000" b="1" smtClean="0">
+              <a:rPr lang="en-GB" altLang="en-US" sz="2000" b="1" dirty="0" smtClean="0">
                 <a:cs typeface="Courier New" panose="02070309020205020404" pitchFamily="49" charset="0"/>
               </a:rPr>
               <a:t>Run the next line of code</a:t>
@@ -6510,7 +6625,7 @@
               <a:buNone/>
             </a:pPr>
             <a:r>
-              <a:rPr lang="en-US" altLang="en-US" sz="1800" i="1" smtClean="0">
+              <a:rPr lang="en-US" altLang="en-US" sz="1800" i="1" dirty="0" smtClean="0">
                 <a:latin typeface="Courier New" panose="02070309020205020404" pitchFamily="49" charset="0"/>
                 <a:cs typeface="Courier New" panose="02070309020205020404" pitchFamily="49" charset="0"/>
               </a:rPr>
@@ -6523,18 +6638,32 @@
               <a:buNone/>
             </a:pPr>
             <a:r>
-              <a:rPr lang="en-US" altLang="en-US" sz="1800" b="1" i="1" smtClean="0">
+              <a:rPr lang="en-US" altLang="en-US" sz="1800" b="1" i="1" dirty="0" smtClean="0">
                 <a:latin typeface="Courier New" panose="02070309020205020404" pitchFamily="49" charset="0"/>
                 <a:cs typeface="Courier New" panose="02070309020205020404" pitchFamily="49" charset="0"/>
               </a:rPr>
               <a:t>&gt;</a:t>
             </a:r>
             <a:r>
-              <a:rPr lang="en-US" altLang="en-US" sz="1800" i="1" smtClean="0">
-                <a:latin typeface="Courier New" panose="02070309020205020404" pitchFamily="49" charset="0"/>
-                <a:cs typeface="Courier New" panose="02070309020205020404" pitchFamily="49" charset="0"/>
-              </a:rPr>
-              <a:t> /home/vagrant/double.py(6)double_it()-&gt;68</a:t>
+              <a:rPr lang="en-US" altLang="en-US" sz="1800" i="1" dirty="0" smtClean="0">
+                <a:latin typeface="Courier New" panose="02070309020205020404" pitchFamily="49" charset="0"/>
+                <a:cs typeface="Courier New" panose="02070309020205020404" pitchFamily="49" charset="0"/>
+              </a:rPr>
+              <a:t> /home/vagrant/double.py(6)</a:t>
+            </a:r>
+            <a:r>
+              <a:rPr lang="en-US" altLang="en-US" sz="1800" i="1" dirty="0" err="1" smtClean="0">
+                <a:latin typeface="Courier New" panose="02070309020205020404" pitchFamily="49" charset="0"/>
+                <a:cs typeface="Courier New" panose="02070309020205020404" pitchFamily="49" charset="0"/>
+              </a:rPr>
+              <a:t>double_it</a:t>
+            </a:r>
+            <a:r>
+              <a:rPr lang="en-US" altLang="en-US" sz="1800" i="1" dirty="0" smtClean="0">
+                <a:latin typeface="Courier New" panose="02070309020205020404" pitchFamily="49" charset="0"/>
+                <a:cs typeface="Courier New" panose="02070309020205020404" pitchFamily="49" charset="0"/>
+              </a:rPr>
+              <a:t>()-&gt;68</a:t>
             </a:r>
           </a:p>
           <a:p>
@@ -6543,20 +6672,20 @@
               <a:buNone/>
             </a:pPr>
             <a:r>
-              <a:rPr lang="en-US" altLang="en-US" sz="1800" b="1" i="1" smtClean="0">
+              <a:rPr lang="en-US" altLang="en-US" sz="1800" b="1" i="1" dirty="0" smtClean="0">
                 <a:latin typeface="Courier New" panose="02070309020205020404" pitchFamily="49" charset="0"/>
                 <a:cs typeface="Courier New" panose="02070309020205020404" pitchFamily="49" charset="0"/>
               </a:rPr>
               <a:t>-&gt;</a:t>
             </a:r>
             <a:r>
-              <a:rPr lang="en-US" altLang="en-US" sz="1800" i="1" smtClean="0">
+              <a:rPr lang="en-US" altLang="en-US" sz="1800" i="1" dirty="0" smtClean="0">
                 <a:latin typeface="Courier New" panose="02070309020205020404" pitchFamily="49" charset="0"/>
                 <a:cs typeface="Courier New" panose="02070309020205020404" pitchFamily="49" charset="0"/>
               </a:rPr>
               <a:t> return double</a:t>
             </a:r>
-            <a:endParaRPr lang="en-GB" altLang="en-US" sz="1800" i="1" smtClean="0">
+            <a:endParaRPr lang="en-GB" altLang="en-US" sz="1800" i="1" dirty="0" smtClean="0">
               <a:latin typeface="Courier New" panose="02070309020205020404" pitchFamily="49" charset="0"/>
               <a:cs typeface="Courier New" panose="02070309020205020404" pitchFamily="49" charset="0"/>
             </a:endParaRPr>

</xml_diff>

<commit_message>
Fixed stray quite in learning_python debugging presentation
</commit_message>
<xml_diff>
--- a/python/presentations/learning_python/21_ceda-log-pdb.pptx
+++ b/python/presentations/learning_python/21_ceda-log-pdb.pptx
@@ -3145,14 +3145,7 @@
                 <a:latin typeface="Courier New" panose="02070309020205020404" pitchFamily="49" charset="0"/>
                 <a:cs typeface="Courier New" panose="02070309020205020404" pitchFamily="49" charset="0"/>
               </a:rPr>
-              <a:t>       </a:t>
-            </a:r>
-            <a:r>
-              <a:rPr lang="en-GB" altLang="en-US" sz="2400" b="1" dirty="0" smtClean="0">
-                <a:latin typeface="Courier New" panose="02070309020205020404" pitchFamily="49" charset="0"/>
-                <a:cs typeface="Courier New" panose="02070309020205020404" pitchFamily="49" charset="0"/>
-              </a:rPr>
-              <a:t>	</a:t>
+              <a:t>       	</a:t>
             </a:r>
             <a:r>
               <a:rPr lang="en-GB" altLang="en-US" sz="2400" b="1" dirty="0" smtClean="0">
@@ -4336,15 +4329,8 @@
                 <a:latin typeface="Courier New" panose="02070309020205020404" pitchFamily="49" charset="0"/>
                 <a:cs typeface="Courier New" panose="02070309020205020404" pitchFamily="49" charset="0"/>
               </a:rPr>
-              <a:t>!"</a:t>
-            </a:r>
-            <a:endParaRPr lang="en-GB" sz="2600" b="1" dirty="0">
-              <a:solidFill>
-                <a:srgbClr val="FF0000"/>
-              </a:solidFill>
-              <a:latin typeface="Courier New" panose="02070309020205020404" pitchFamily="49" charset="0"/>
-              <a:cs typeface="Courier New" panose="02070309020205020404" pitchFamily="49" charset="0"/>
-            </a:endParaRPr>
+              <a:t>!</a:t>
+            </a:r>
           </a:p>
         </p:txBody>
       </p:sp>
@@ -6506,30 +6492,10 @@
                 <a:latin typeface="Courier New" panose="02070309020205020404" pitchFamily="49" charset="0"/>
                 <a:cs typeface="Courier New" panose="02070309020205020404" pitchFamily="49" charset="0"/>
               </a:rPr>
-              <a:t>print(double</a:t>
+              <a:t>print(double, x)   </a:t>
             </a:r>
             <a:r>
               <a:rPr lang="en-GB" altLang="en-US" sz="1800" dirty="0" smtClean="0">
-                <a:solidFill>
-                  <a:srgbClr val="008000"/>
-                </a:solidFill>
-                <a:latin typeface="Courier New" panose="02070309020205020404" pitchFamily="49" charset="0"/>
-                <a:cs typeface="Courier New" panose="02070309020205020404" pitchFamily="49" charset="0"/>
-              </a:rPr>
-              <a:t>, </a:t>
-            </a:r>
-            <a:r>
-              <a:rPr lang="en-GB" altLang="en-US" sz="1800" dirty="0" smtClean="0">
-                <a:solidFill>
-                  <a:srgbClr val="008000"/>
-                </a:solidFill>
-                <a:latin typeface="Courier New" panose="02070309020205020404" pitchFamily="49" charset="0"/>
-                <a:cs typeface="Courier New" panose="02070309020205020404" pitchFamily="49" charset="0"/>
-              </a:rPr>
-              <a:t>x)   </a:t>
-            </a:r>
-            <a:r>
-              <a:rPr lang="en-GB" altLang="en-US" sz="1800" dirty="0" smtClean="0">
                 <a:latin typeface="Courier New" panose="02070309020205020404" pitchFamily="49" charset="0"/>
                 <a:cs typeface="Courier New" panose="02070309020205020404" pitchFamily="49" charset="0"/>
               </a:rPr>
@@ -6554,10 +6520,6 @@
               </a:rPr>
               <a:t>68 34</a:t>
             </a:r>
-            <a:endParaRPr lang="en-GB" altLang="en-US" sz="1800" i="1" dirty="0" smtClean="0">
-              <a:latin typeface="Courier New" panose="02070309020205020404" pitchFamily="49" charset="0"/>
-              <a:cs typeface="Courier New" panose="02070309020205020404" pitchFamily="49" charset="0"/>
-            </a:endParaRPr>
           </a:p>
           <a:p>
             <a:pPr eaLnBrk="1" hangingPunct="1">

</xml_diff>

<commit_message>
modified logging to use __name__ and added a short section about debugging with IDEs
</commit_message>
<xml_diff>
--- a/python/presentations/learning_python/21_ceda-log-pdb.pptx
+++ b/python/presentations/learning_python/21_ceda-log-pdb.pptx
@@ -15,6 +15,10 @@
     <p:sldId id="263" r:id="rId9"/>
     <p:sldId id="264" r:id="rId10"/>
     <p:sldId id="265" r:id="rId11"/>
+    <p:sldId id="267" r:id="rId12"/>
+    <p:sldId id="269" r:id="rId13"/>
+    <p:sldId id="268" r:id="rId14"/>
+    <p:sldId id="270" r:id="rId15"/>
   </p:sldIdLst>
   <p:sldSz cx="9144000" cy="6858000" type="screen4x3"/>
   <p:notesSz cx="6858000" cy="9144000"/>
@@ -375,7 +379,7 @@
           </a:lstStyle>
           <a:p>
             <a:r>
-              <a:rPr lang="en-US" smtClean="0"/>
+              <a:rPr lang="en-US"/>
               <a:t>Click to edit Master title style</a:t>
             </a:r>
             <a:endParaRPr lang="en-US" dirty="0"/>
@@ -451,7 +455,7 @@
           </a:lstStyle>
           <a:p>
             <a:r>
-              <a:rPr lang="en-US" smtClean="0"/>
+              <a:rPr lang="en-US"/>
               <a:t>Click to edit Master subtitle style</a:t>
             </a:r>
             <a:endParaRPr lang="en-US" dirty="0"/>
@@ -520,7 +524,7 @@
           </a:lstStyle>
           <a:p>
             <a:r>
-              <a:rPr lang="en-US" smtClean="0"/>
+              <a:rPr lang="en-US"/>
               <a:t>Click to edit Master title style</a:t>
             </a:r>
             <a:endParaRPr lang="en-US" dirty="0"/>
@@ -594,7 +598,7 @@
           </a:lstStyle>
           <a:p>
             <a:r>
-              <a:rPr lang="en-US" smtClean="0"/>
+              <a:rPr lang="en-US"/>
               <a:t>Click to edit Master subtitle style</a:t>
             </a:r>
             <a:endParaRPr lang="en-US" dirty="0"/>
@@ -641,7 +645,7 @@
           <a:p>
             <a:pPr lvl="0"/>
             <a:r>
-              <a:rPr lang="en-US" noProof="0" smtClean="0"/>
+              <a:rPr lang="en-US" noProof="0"/>
               <a:t>Click icon to add picture</a:t>
             </a:r>
             <a:endParaRPr lang="en-GB" noProof="0" dirty="0"/>
@@ -689,7 +693,7 @@
               <a:pPr>
                 <a:defRPr/>
               </a:pPr>
-              <a:t>21/11/2019</a:t>
+              <a:t>18/10/2021</a:t>
             </a:fld>
             <a:endParaRPr lang="en-GB"/>
           </a:p>
@@ -757,7 +761,7 @@
           </a:lstStyle>
           <a:p>
             <a:r>
-              <a:rPr lang="en-US" smtClean="0"/>
+              <a:rPr lang="en-US"/>
               <a:t>Click to edit Master title style</a:t>
             </a:r>
             <a:endParaRPr lang="en-US" dirty="0"/>
@@ -831,7 +835,7 @@
           </a:lstStyle>
           <a:p>
             <a:r>
-              <a:rPr lang="en-US" smtClean="0"/>
+              <a:rPr lang="en-US"/>
               <a:t>Click to edit Master subtitle style</a:t>
             </a:r>
             <a:endParaRPr lang="en-US" dirty="0"/>
@@ -878,7 +882,7 @@
           <a:p>
             <a:pPr lvl="0"/>
             <a:r>
-              <a:rPr lang="en-US" noProof="0" smtClean="0"/>
+              <a:rPr lang="en-US" noProof="0"/>
               <a:t>Click icon to add picture</a:t>
             </a:r>
             <a:endParaRPr lang="en-GB" noProof="0" dirty="0"/>
@@ -926,7 +930,7 @@
               <a:pPr>
                 <a:defRPr/>
               </a:pPr>
-              <a:t>21/11/2019</a:t>
+              <a:t>18/10/2021</a:t>
             </a:fld>
             <a:endParaRPr lang="en-GB"/>
           </a:p>
@@ -1029,7 +1033,7 @@
           </a:lstStyle>
           <a:p>
             <a:r>
-              <a:rPr lang="en-US" smtClean="0"/>
+              <a:rPr lang="en-US"/>
               <a:t>Click to edit Master title style</a:t>
             </a:r>
             <a:endParaRPr lang="en-US" dirty="0"/>
@@ -1076,7 +1080,7 @@
           <a:p>
             <a:pPr lvl="0"/>
             <a:r>
-              <a:rPr lang="en-US" noProof="0" smtClean="0"/>
+              <a:rPr lang="en-US" noProof="0"/>
               <a:t>Click icon to add picture</a:t>
             </a:r>
             <a:endParaRPr lang="en-GB" noProof="0" dirty="0"/>
@@ -1132,35 +1136,35 @@
           <a:p>
             <a:pPr lvl="0"/>
             <a:r>
-              <a:rPr lang="en-US" smtClean="0"/>
+              <a:rPr lang="en-US"/>
               <a:t>Edit Master text styles</a:t>
             </a:r>
           </a:p>
           <a:p>
             <a:pPr lvl="1"/>
             <a:r>
-              <a:rPr lang="en-US" smtClean="0"/>
+              <a:rPr lang="en-US"/>
               <a:t>Second level</a:t>
             </a:r>
           </a:p>
           <a:p>
             <a:pPr lvl="2"/>
             <a:r>
-              <a:rPr lang="en-US" smtClean="0"/>
+              <a:rPr lang="en-US"/>
               <a:t>Third level</a:t>
             </a:r>
           </a:p>
           <a:p>
             <a:pPr lvl="3"/>
             <a:r>
-              <a:rPr lang="en-US" smtClean="0"/>
+              <a:rPr lang="en-US"/>
               <a:t>Fourth level</a:t>
             </a:r>
           </a:p>
           <a:p>
             <a:pPr lvl="4"/>
             <a:r>
-              <a:rPr lang="en-US" smtClean="0"/>
+              <a:rPr lang="en-US"/>
               <a:t>Fifth level</a:t>
             </a:r>
             <a:endParaRPr lang="en-US" dirty="0"/>
@@ -1264,7 +1268,7 @@
           </a:lstStyle>
           <a:p>
             <a:r>
-              <a:rPr lang="en-US" smtClean="0"/>
+              <a:rPr lang="en-US"/>
               <a:t>Click to edit Master title style</a:t>
             </a:r>
             <a:endParaRPr lang="en-US" dirty="0"/>
@@ -1320,35 +1324,35 @@
           <a:p>
             <a:pPr lvl="0"/>
             <a:r>
-              <a:rPr lang="en-US" smtClean="0"/>
+              <a:rPr lang="en-US"/>
               <a:t>Edit Master text styles</a:t>
             </a:r>
           </a:p>
           <a:p>
             <a:pPr lvl="1"/>
             <a:r>
-              <a:rPr lang="en-US" smtClean="0"/>
+              <a:rPr lang="en-US"/>
               <a:t>Second level</a:t>
             </a:r>
           </a:p>
           <a:p>
             <a:pPr lvl="2"/>
             <a:r>
-              <a:rPr lang="en-US" smtClean="0"/>
+              <a:rPr lang="en-US"/>
               <a:t>Third level</a:t>
             </a:r>
           </a:p>
           <a:p>
             <a:pPr lvl="3"/>
             <a:r>
-              <a:rPr lang="en-US" smtClean="0"/>
+              <a:rPr lang="en-US"/>
               <a:t>Fourth level</a:t>
             </a:r>
           </a:p>
           <a:p>
             <a:pPr lvl="4"/>
             <a:r>
-              <a:rPr lang="en-US" smtClean="0"/>
+              <a:rPr lang="en-US"/>
               <a:t>Fifth level</a:t>
             </a:r>
             <a:endParaRPr lang="en-US" dirty="0"/>
@@ -1429,7 +1433,7 @@
           </a:lstStyle>
           <a:p>
             <a:r>
-              <a:rPr lang="en-US" smtClean="0"/>
+              <a:rPr lang="en-US"/>
               <a:t>Click to edit Master title style</a:t>
             </a:r>
             <a:endParaRPr lang="en-US" dirty="0"/>
@@ -1503,7 +1507,7 @@
           </a:lstStyle>
           <a:p>
             <a:r>
-              <a:rPr lang="en-US" smtClean="0"/>
+              <a:rPr lang="en-US"/>
               <a:t>Click to edit Master subtitle style</a:t>
             </a:r>
             <a:endParaRPr lang="en-US" dirty="0"/>
@@ -1556,7 +1560,7 @@
           <a:lstStyle/>
           <a:p>
             <a:r>
-              <a:rPr lang="en-US" smtClean="0"/>
+              <a:rPr lang="en-US"/>
               <a:t>Click to edit Master title style</a:t>
             </a:r>
             <a:endParaRPr lang="en-GB"/>
@@ -1580,35 +1584,35 @@
           <a:p>
             <a:pPr lvl="0"/>
             <a:r>
-              <a:rPr lang="en-US" smtClean="0"/>
+              <a:rPr lang="en-US"/>
               <a:t>Click to edit Master text styles</a:t>
             </a:r>
           </a:p>
           <a:p>
             <a:pPr lvl="1"/>
             <a:r>
-              <a:rPr lang="en-US" smtClean="0"/>
+              <a:rPr lang="en-US"/>
               <a:t>Second level</a:t>
             </a:r>
           </a:p>
           <a:p>
             <a:pPr lvl="2"/>
             <a:r>
-              <a:rPr lang="en-US" smtClean="0"/>
+              <a:rPr lang="en-US"/>
               <a:t>Third level</a:t>
             </a:r>
           </a:p>
           <a:p>
             <a:pPr lvl="3"/>
             <a:r>
-              <a:rPr lang="en-US" smtClean="0"/>
+              <a:rPr lang="en-US"/>
               <a:t>Fourth level</a:t>
             </a:r>
           </a:p>
           <a:p>
             <a:pPr lvl="4"/>
             <a:r>
-              <a:rPr lang="en-US" smtClean="0"/>
+              <a:rPr lang="en-US"/>
               <a:t>Fifth level</a:t>
             </a:r>
             <a:endParaRPr lang="en-GB"/>
@@ -1647,7 +1651,7 @@
               <a:pPr>
                 <a:defRPr/>
               </a:pPr>
-              <a:t>21/11/2019</a:t>
+              <a:t>18/10/2021</a:t>
             </a:fld>
             <a:endParaRPr lang="en-GB"/>
           </a:p>
@@ -1978,35 +1982,35 @@
           <a:p>
             <a:pPr lvl="0"/>
             <a:r>
-              <a:rPr lang="en-US" altLang="en-US" smtClean="0"/>
+              <a:rPr lang="en-US" altLang="en-US"/>
               <a:t>Edit Master text styles</a:t>
             </a:r>
           </a:p>
           <a:p>
             <a:pPr lvl="1"/>
             <a:r>
-              <a:rPr lang="en-US" altLang="en-US" smtClean="0"/>
+              <a:rPr lang="en-US" altLang="en-US"/>
               <a:t>Second level</a:t>
             </a:r>
           </a:p>
           <a:p>
             <a:pPr lvl="2"/>
             <a:r>
-              <a:rPr lang="en-US" altLang="en-US" smtClean="0"/>
+              <a:rPr lang="en-US" altLang="en-US"/>
               <a:t>Third level</a:t>
             </a:r>
           </a:p>
           <a:p>
             <a:pPr lvl="3"/>
             <a:r>
-              <a:rPr lang="en-US" altLang="en-US" smtClean="0"/>
+              <a:rPr lang="en-US" altLang="en-US"/>
               <a:t>Fourth level</a:t>
             </a:r>
           </a:p>
           <a:p>
             <a:pPr lvl="4"/>
             <a:r>
-              <a:rPr lang="en-US" altLang="en-US" smtClean="0"/>
+              <a:rPr lang="en-US" altLang="en-US"/>
               <a:t>Fifth level</a:t>
             </a:r>
           </a:p>
@@ -2167,7 +2171,7 @@
             <a:pPr eaLnBrk="1" hangingPunct="1">
               <a:defRPr/>
             </a:pPr>
-            <a:endParaRPr lang="en-US" altLang="en-US" smtClean="0"/>
+            <a:endParaRPr lang="en-US" altLang="en-US"/>
           </a:p>
         </p:txBody>
       </p:sp>
@@ -2223,10 +2227,10 @@
           <a:p>
             <a:pPr lvl="0"/>
             <a:r>
-              <a:rPr lang="en-US" altLang="en-US" smtClean="0"/>
+              <a:rPr lang="en-US" altLang="en-US"/>
               <a:t>Click to edit Master title style</a:t>
             </a:r>
-            <a:endParaRPr lang="en-GB" altLang="en-US" smtClean="0"/>
+            <a:endParaRPr lang="en-GB" altLang="en-US"/>
           </a:p>
         </p:txBody>
       </p:sp>
@@ -2779,7 +2783,7 @@
           <a:p>
             <a:pPr eaLnBrk="1" hangingPunct="1"/>
             <a:r>
-              <a:rPr lang="en-GB" altLang="en-US" smtClean="0"/>
+              <a:rPr lang="en-GB" altLang="en-US"/>
               <a:t>Python</a:t>
             </a:r>
           </a:p>
@@ -2807,7 +2811,7 @@
           <a:p>
             <a:pPr eaLnBrk="1" hangingPunct="1"/>
             <a:r>
-              <a:rPr lang="en-GB" altLang="en-US" smtClean="0"/>
+              <a:rPr lang="en-GB" altLang="en-US"/>
               <a:t>Logging and Debugging</a:t>
             </a:r>
           </a:p>
@@ -2855,7 +2859,7 @@
           <a:p>
             <a:pPr eaLnBrk="1" hangingPunct="1"/>
             <a:r>
-              <a:rPr lang="en-GB" altLang="en-US" b="1" smtClean="0"/>
+              <a:rPr lang="en-GB" altLang="en-US" b="1"/>
               <a:t>Finding the error</a:t>
             </a:r>
           </a:p>
@@ -2887,7 +2891,7 @@
               <a:defRPr/>
             </a:pPr>
             <a:r>
-              <a:rPr lang="en-GB" altLang="en-US" sz="2400" b="1" dirty="0" smtClean="0">
+              <a:rPr lang="en-GB" altLang="en-US" sz="2400" b="1" dirty="0">
                 <a:latin typeface="Courier New" panose="02070309020205020404" pitchFamily="49" charset="0"/>
                 <a:cs typeface="Courier New" panose="02070309020205020404" pitchFamily="49" charset="0"/>
               </a:rPr>
@@ -2904,28 +2908,28 @@
               <a:defRPr/>
             </a:pPr>
             <a:r>
-              <a:rPr lang="en-GB" altLang="en-US" sz="2400" b="1" dirty="0" smtClean="0">
+              <a:rPr lang="en-GB" altLang="en-US" sz="2400" b="1" dirty="0">
                 <a:latin typeface="Courier New" panose="02070309020205020404" pitchFamily="49" charset="0"/>
                 <a:cs typeface="Courier New" panose="02070309020205020404" pitchFamily="49" charset="0"/>
               </a:rPr>
               <a:t>(</a:t>
             </a:r>
             <a:r>
-              <a:rPr lang="en-GB" altLang="en-US" sz="2400" b="1" dirty="0" err="1" smtClean="0">
+              <a:rPr lang="en-GB" altLang="en-US" sz="2400" b="1" dirty="0" err="1">
                 <a:latin typeface="Courier New" panose="02070309020205020404" pitchFamily="49" charset="0"/>
                 <a:cs typeface="Courier New" panose="02070309020205020404" pitchFamily="49" charset="0"/>
               </a:rPr>
               <a:t>Pdb</a:t>
             </a:r>
             <a:r>
-              <a:rPr lang="en-GB" altLang="en-US" sz="2400" b="1" dirty="0" smtClean="0">
+              <a:rPr lang="en-GB" altLang="en-US" sz="2400" b="1" dirty="0">
                 <a:latin typeface="Courier New" panose="02070309020205020404" pitchFamily="49" charset="0"/>
                 <a:cs typeface="Courier New" panose="02070309020205020404" pitchFamily="49" charset="0"/>
               </a:rPr>
               <a:t>) </a:t>
             </a:r>
             <a:r>
-              <a:rPr lang="en-GB" altLang="en-US" sz="2400" dirty="0" smtClean="0">
+              <a:rPr lang="en-GB" altLang="en-US" sz="2400" dirty="0">
                 <a:solidFill>
                   <a:srgbClr val="008000"/>
                 </a:solidFill>
@@ -2935,14 +2939,14 @@
               <a:t>n</a:t>
             </a:r>
             <a:r>
-              <a:rPr lang="en-GB" altLang="en-US" sz="2400" b="1" dirty="0" smtClean="0">
+              <a:rPr lang="en-GB" altLang="en-US" sz="2400" b="1" dirty="0">
                 <a:latin typeface="Courier New" panose="02070309020205020404" pitchFamily="49" charset="0"/>
                 <a:cs typeface="Courier New" panose="02070309020205020404" pitchFamily="49" charset="0"/>
               </a:rPr>
               <a:t>    	</a:t>
             </a:r>
             <a:r>
-              <a:rPr lang="en-GB" altLang="en-US" sz="2400" b="1" dirty="0" smtClean="0">
+              <a:rPr lang="en-GB" altLang="en-US" sz="2400" b="1" dirty="0">
                 <a:cs typeface="Courier New" panose="02070309020205020404" pitchFamily="49" charset="0"/>
               </a:rPr>
               <a:t>Step through until we hit the error</a:t>
@@ -3008,7 +3012,7 @@
               <a:t>dict</a:t>
             </a:r>
             <a:r>
-              <a:rPr lang="en-US" altLang="en-US" sz="2400" dirty="0" smtClean="0">
+              <a:rPr lang="en-US" altLang="en-US" sz="2400" dirty="0">
                 <a:solidFill>
                   <a:srgbClr val="FF0000"/>
                 </a:solidFill>
@@ -3039,17 +3043,10 @@
                 <a:latin typeface="Courier New" panose="02070309020205020404" pitchFamily="49" charset="0"/>
                 <a:cs typeface="Courier New" panose="02070309020205020404" pitchFamily="49" charset="0"/>
               </a:rPr>
-              <a:t> /</a:t>
-            </a:r>
-            <a:r>
-              <a:rPr lang="en-GB" altLang="en-US" sz="2400" i="1" dirty="0" smtClean="0">
-                <a:latin typeface="Courier New" panose="02070309020205020404" pitchFamily="49" charset="0"/>
-                <a:cs typeface="Courier New" panose="02070309020205020404" pitchFamily="49" charset="0"/>
-              </a:rPr>
-              <a:t>home/vagrant/double.py(5)</a:t>
-            </a:r>
-            <a:r>
-              <a:rPr lang="en-GB" altLang="en-US" sz="2400" i="1" dirty="0" err="1" smtClean="0">
+              <a:t> /home/vagrant/double.py(5)</a:t>
+            </a:r>
+            <a:r>
+              <a:rPr lang="en-GB" altLang="en-US" sz="2400" i="1" dirty="0" err="1">
                 <a:latin typeface="Courier New" panose="02070309020205020404" pitchFamily="49" charset="0"/>
                 <a:cs typeface="Courier New" panose="02070309020205020404" pitchFamily="49" charset="0"/>
               </a:rPr>
@@ -3087,14 +3084,14 @@
               <a:t> double = 2 * x</a:t>
             </a:r>
             <a:r>
-              <a:rPr lang="en-GB" altLang="en-US" sz="2400" dirty="0" smtClean="0">
+              <a:rPr lang="en-GB" altLang="en-US" sz="2400" dirty="0">
                 <a:latin typeface="Courier New" panose="02070309020205020404" pitchFamily="49" charset="0"/>
                 <a:cs typeface="Courier New" panose="02070309020205020404" pitchFamily="49" charset="0"/>
               </a:rPr>
               <a:t>	</a:t>
             </a:r>
             <a:r>
-              <a:rPr lang="en-GB" altLang="en-US" sz="2400" b="1" dirty="0" smtClean="0">
+              <a:rPr lang="en-GB" altLang="en-US" sz="2400" b="1" dirty="0">
                 <a:cs typeface="Courier New" panose="02070309020205020404" pitchFamily="49" charset="0"/>
               </a:rPr>
               <a:t>The line where the error 						occurred</a:t>
@@ -3110,28 +3107,28 @@
               <a:defRPr/>
             </a:pPr>
             <a:r>
-              <a:rPr lang="en-GB" altLang="en-US" sz="2400" b="1" dirty="0" smtClean="0">
+              <a:rPr lang="en-GB" altLang="en-US" sz="2400" b="1" dirty="0">
                 <a:latin typeface="Courier New" panose="02070309020205020404" pitchFamily="49" charset="0"/>
                 <a:cs typeface="Courier New" panose="02070309020205020404" pitchFamily="49" charset="0"/>
               </a:rPr>
               <a:t>(</a:t>
             </a:r>
             <a:r>
-              <a:rPr lang="en-GB" altLang="en-US" sz="2400" b="1" dirty="0" err="1" smtClean="0">
+              <a:rPr lang="en-GB" altLang="en-US" sz="2400" b="1" dirty="0" err="1">
                 <a:latin typeface="Courier New" panose="02070309020205020404" pitchFamily="49" charset="0"/>
                 <a:cs typeface="Courier New" panose="02070309020205020404" pitchFamily="49" charset="0"/>
               </a:rPr>
               <a:t>Pdb</a:t>
             </a:r>
             <a:r>
-              <a:rPr lang="en-GB" altLang="en-US" sz="2400" b="1" dirty="0" smtClean="0">
+              <a:rPr lang="en-GB" altLang="en-US" sz="2400" b="1" dirty="0">
                 <a:latin typeface="Courier New" panose="02070309020205020404" pitchFamily="49" charset="0"/>
                 <a:cs typeface="Courier New" panose="02070309020205020404" pitchFamily="49" charset="0"/>
               </a:rPr>
               <a:t>) </a:t>
             </a:r>
             <a:r>
-              <a:rPr lang="en-GB" altLang="en-US" sz="2400" dirty="0" smtClean="0">
+              <a:rPr lang="en-GB" altLang="en-US" sz="2400" dirty="0">
                 <a:solidFill>
                   <a:srgbClr val="008000"/>
                 </a:solidFill>
@@ -3141,14 +3138,14 @@
               <a:t>print(x)</a:t>
             </a:r>
             <a:r>
-              <a:rPr lang="en-GB" altLang="en-US" sz="2400" b="1" dirty="0" smtClean="0">
+              <a:rPr lang="en-GB" altLang="en-US" sz="2400" b="1" dirty="0">
                 <a:latin typeface="Courier New" panose="02070309020205020404" pitchFamily="49" charset="0"/>
                 <a:cs typeface="Courier New" panose="02070309020205020404" pitchFamily="49" charset="0"/>
               </a:rPr>
               <a:t>       	</a:t>
             </a:r>
             <a:r>
-              <a:rPr lang="en-GB" altLang="en-US" sz="2400" b="1" dirty="0" smtClean="0">
+              <a:rPr lang="en-GB" altLang="en-US" sz="2400" b="1" dirty="0">
                 <a:cs typeface="Courier New" panose="02070309020205020404" pitchFamily="49" charset="0"/>
               </a:rPr>
               <a:t>Let's look at x when the error occurred</a:t>
@@ -3164,7 +3161,7 @@
               <a:defRPr/>
             </a:pPr>
             <a:r>
-              <a:rPr lang="en-GB" altLang="en-US" sz="2400" i="1" dirty="0" smtClean="0">
+              <a:rPr lang="en-GB" altLang="en-US" sz="2400" i="1" dirty="0">
                 <a:latin typeface="Courier New" panose="02070309020205020404" pitchFamily="49" charset="0"/>
                 <a:cs typeface="Courier New" panose="02070309020205020404" pitchFamily="49" charset="0"/>
               </a:rPr>
@@ -3181,28 +3178,28 @@
               <a:defRPr/>
             </a:pPr>
             <a:r>
-              <a:rPr lang="en-GB" altLang="en-US" sz="2400" b="1" dirty="0" smtClean="0">
+              <a:rPr lang="en-GB" altLang="en-US" sz="2400" b="1" dirty="0">
                 <a:latin typeface="Courier New" panose="02070309020205020404" pitchFamily="49" charset="0"/>
                 <a:cs typeface="Courier New" panose="02070309020205020404" pitchFamily="49" charset="0"/>
               </a:rPr>
               <a:t>(</a:t>
             </a:r>
             <a:r>
-              <a:rPr lang="en-GB" altLang="en-US" sz="2400" b="1" dirty="0" err="1" smtClean="0">
+              <a:rPr lang="en-GB" altLang="en-US" sz="2400" b="1" dirty="0" err="1">
                 <a:latin typeface="Courier New" panose="02070309020205020404" pitchFamily="49" charset="0"/>
                 <a:cs typeface="Courier New" panose="02070309020205020404" pitchFamily="49" charset="0"/>
               </a:rPr>
               <a:t>Pdb</a:t>
             </a:r>
             <a:r>
-              <a:rPr lang="en-GB" altLang="en-US" sz="2400" b="1" dirty="0" smtClean="0">
+              <a:rPr lang="en-GB" altLang="en-US" sz="2400" b="1" dirty="0">
                 <a:latin typeface="Courier New" panose="02070309020205020404" pitchFamily="49" charset="0"/>
                 <a:cs typeface="Courier New" panose="02070309020205020404" pitchFamily="49" charset="0"/>
               </a:rPr>
               <a:t>) </a:t>
             </a:r>
             <a:r>
-              <a:rPr lang="en-GB" altLang="en-US" sz="2400" dirty="0" smtClean="0">
+              <a:rPr lang="en-GB" altLang="en-US" sz="2400" dirty="0">
                 <a:solidFill>
                   <a:srgbClr val="008000"/>
                 </a:solidFill>
@@ -3212,14 +3209,14 @@
               <a:t>type(x)    </a:t>
             </a:r>
             <a:r>
-              <a:rPr lang="en-GB" altLang="en-US" sz="2400" dirty="0" smtClean="0">
+              <a:rPr lang="en-GB" altLang="en-US" sz="2400" dirty="0">
                 <a:latin typeface="Courier New" panose="02070309020205020404" pitchFamily="49" charset="0"/>
                 <a:cs typeface="Courier New" panose="02070309020205020404" pitchFamily="49" charset="0"/>
               </a:rPr>
               <a:t>	</a:t>
             </a:r>
             <a:r>
-              <a:rPr lang="en-GB" altLang="en-US" sz="2400" b="1" dirty="0" smtClean="0">
+              <a:rPr lang="en-GB" altLang="en-US" sz="2400" b="1" dirty="0">
                 <a:cs typeface="Courier New" panose="02070309020205020404" pitchFamily="49" charset="0"/>
               </a:rPr>
               <a:t>It failed because we can't double a 					dictionary!</a:t>
@@ -3235,21 +3232,21 @@
               <a:defRPr/>
             </a:pPr>
             <a:r>
-              <a:rPr lang="en-GB" altLang="en-US" sz="2400" i="1" dirty="0" smtClean="0">
+              <a:rPr lang="en-GB" altLang="en-US" sz="2400" i="1" dirty="0">
                 <a:latin typeface="Courier New" panose="02070309020205020404" pitchFamily="49" charset="0"/>
                 <a:cs typeface="Courier New" panose="02070309020205020404" pitchFamily="49" charset="0"/>
               </a:rPr>
               <a:t>&lt;class '</a:t>
             </a:r>
             <a:r>
-              <a:rPr lang="en-GB" altLang="en-US" sz="2400" i="1" dirty="0" err="1" smtClean="0">
+              <a:rPr lang="en-GB" altLang="en-US" sz="2400" i="1" dirty="0" err="1">
                 <a:latin typeface="Courier New" panose="02070309020205020404" pitchFamily="49" charset="0"/>
                 <a:cs typeface="Courier New" panose="02070309020205020404" pitchFamily="49" charset="0"/>
               </a:rPr>
               <a:t>dict</a:t>
             </a:r>
             <a:r>
-              <a:rPr lang="en-GB" altLang="en-US" sz="2400" i="1" dirty="0" smtClean="0">
+              <a:rPr lang="en-GB" altLang="en-US" sz="2400" i="1" dirty="0">
                 <a:latin typeface="Courier New" panose="02070309020205020404" pitchFamily="49" charset="0"/>
                 <a:cs typeface="Courier New" panose="02070309020205020404" pitchFamily="49" charset="0"/>
               </a:rPr>
@@ -3552,6 +3549,690 @@
 </p:sld>
 </file>
 
+<file path=ppt/slides/slide11.xml><?xml version="1.0" encoding="utf-8"?>
+<p:sld xmlns:a="http://schemas.openxmlformats.org/drawingml/2006/main" xmlns:r="http://schemas.openxmlformats.org/officeDocument/2006/relationships" xmlns:p="http://schemas.openxmlformats.org/presentationml/2006/main">
+  <p:cSld>
+    <p:spTree>
+      <p:nvGrpSpPr>
+        <p:cNvPr id="1" name=""/>
+        <p:cNvGrpSpPr/>
+        <p:nvPr/>
+      </p:nvGrpSpPr>
+      <p:grpSpPr>
+        <a:xfrm>
+          <a:off x="0" y="0"/>
+          <a:ext cx="0" cy="0"/>
+          <a:chOff x="0" y="0"/>
+          <a:chExt cx="0" cy="0"/>
+        </a:xfrm>
+      </p:grpSpPr>
+      <p:sp>
+        <p:nvSpPr>
+          <p:cNvPr id="18434" name="Title 1"/>
+          <p:cNvSpPr>
+            <a:spLocks noGrp="1"/>
+          </p:cNvSpPr>
+          <p:nvPr>
+            <p:ph type="title"/>
+          </p:nvPr>
+        </p:nvSpPr>
+        <p:spPr>
+          <a:xfrm>
+            <a:off x="391383" y="188640"/>
+            <a:ext cx="8418512" cy="881063"/>
+          </a:xfrm>
+        </p:spPr>
+        <p:txBody>
+          <a:bodyPr/>
+          <a:lstStyle/>
+          <a:p>
+            <a:pPr eaLnBrk="1" hangingPunct="1"/>
+            <a:r>
+              <a:rPr lang="en-GB" altLang="en-US" b="1" dirty="0"/>
+              <a:t>IDEs Wrap this up nicely</a:t>
+            </a:r>
+          </a:p>
+        </p:txBody>
+      </p:sp>
+      <p:pic>
+        <p:nvPicPr>
+          <p:cNvPr id="7" name="Content Placeholder 6" descr="Graphical user interface, text&#10;&#10;Description automatically generated">
+            <a:extLst>
+              <a:ext uri="{FF2B5EF4-FFF2-40B4-BE49-F238E27FC236}">
+                <a16:creationId xmlns:a16="http://schemas.microsoft.com/office/drawing/2014/main" id="{9F3C072A-6F04-804F-9C99-19479173DD5C}"/>
+              </a:ext>
+            </a:extLst>
+          </p:cNvPr>
+          <p:cNvPicPr>
+            <a:picLocks noGrp="1" noChangeAspect="1"/>
+          </p:cNvPicPr>
+          <p:nvPr>
+            <p:ph idx="1"/>
+          </p:nvPr>
+        </p:nvPicPr>
+        <p:blipFill>
+          <a:blip r:embed="rId2">
+            <a:extLst>
+              <a:ext uri="{28A0092B-C50C-407E-A947-70E740481C1C}">
+                <a14:useLocalDpi xmlns:a14="http://schemas.microsoft.com/office/drawing/2010/main" val="0"/>
+              </a:ext>
+            </a:extLst>
+          </a:blip>
+          <a:stretch>
+            <a:fillRect/>
+          </a:stretch>
+        </p:blipFill>
+        <p:spPr>
+          <a:xfrm>
+            <a:off x="349250" y="980728"/>
+            <a:ext cx="8418512" cy="5162941"/>
+          </a:xfrm>
+        </p:spPr>
+      </p:pic>
+    </p:spTree>
+    <p:extLst>
+      <p:ext uri="{BB962C8B-B14F-4D97-AF65-F5344CB8AC3E}">
+        <p14:creationId xmlns:p14="http://schemas.microsoft.com/office/powerpoint/2010/main" val="1586770842"/>
+      </p:ext>
+    </p:extLst>
+  </p:cSld>
+  <p:clrMapOvr>
+    <a:masterClrMapping/>
+  </p:clrMapOvr>
+</p:sld>
+</file>
+
+<file path=ppt/slides/slide12.xml><?xml version="1.0" encoding="utf-8"?>
+<p:sld xmlns:a="http://schemas.openxmlformats.org/drawingml/2006/main" xmlns:r="http://schemas.openxmlformats.org/officeDocument/2006/relationships" xmlns:p="http://schemas.openxmlformats.org/presentationml/2006/main">
+  <p:cSld>
+    <p:spTree>
+      <p:nvGrpSpPr>
+        <p:cNvPr id="1" name=""/>
+        <p:cNvGrpSpPr/>
+        <p:nvPr/>
+      </p:nvGrpSpPr>
+      <p:grpSpPr>
+        <a:xfrm>
+          <a:off x="0" y="0"/>
+          <a:ext cx="0" cy="0"/>
+          <a:chOff x="0" y="0"/>
+          <a:chExt cx="0" cy="0"/>
+        </a:xfrm>
+      </p:grpSpPr>
+      <p:sp>
+        <p:nvSpPr>
+          <p:cNvPr id="18434" name="Title 1"/>
+          <p:cNvSpPr>
+            <a:spLocks noGrp="1"/>
+          </p:cNvSpPr>
+          <p:nvPr>
+            <p:ph type="title"/>
+          </p:nvPr>
+        </p:nvSpPr>
+        <p:spPr>
+          <a:xfrm>
+            <a:off x="391383" y="188640"/>
+            <a:ext cx="8418512" cy="881063"/>
+          </a:xfrm>
+        </p:spPr>
+        <p:txBody>
+          <a:bodyPr/>
+          <a:lstStyle/>
+          <a:p>
+            <a:pPr eaLnBrk="1" hangingPunct="1"/>
+            <a:r>
+              <a:rPr lang="en-GB" altLang="en-US" b="1" dirty="0"/>
+              <a:t>IDEs Wrap this up nicely</a:t>
+            </a:r>
+          </a:p>
+        </p:txBody>
+      </p:sp>
+      <p:pic>
+        <p:nvPicPr>
+          <p:cNvPr id="7" name="Content Placeholder 6" descr="Graphical user interface, text&#10;&#10;Description automatically generated">
+            <a:extLst>
+              <a:ext uri="{FF2B5EF4-FFF2-40B4-BE49-F238E27FC236}">
+                <a16:creationId xmlns:a16="http://schemas.microsoft.com/office/drawing/2014/main" id="{9F3C072A-6F04-804F-9C99-19479173DD5C}"/>
+              </a:ext>
+            </a:extLst>
+          </p:cNvPr>
+          <p:cNvPicPr>
+            <a:picLocks noGrp="1" noChangeAspect="1"/>
+          </p:cNvPicPr>
+          <p:nvPr>
+            <p:ph idx="1"/>
+          </p:nvPr>
+        </p:nvPicPr>
+        <p:blipFill>
+          <a:blip r:embed="rId2">
+            <a:extLst>
+              <a:ext uri="{28A0092B-C50C-407E-A947-70E740481C1C}">
+                <a14:useLocalDpi xmlns:a14="http://schemas.microsoft.com/office/drawing/2010/main" val="0"/>
+              </a:ext>
+            </a:extLst>
+          </a:blip>
+          <a:stretch>
+            <a:fillRect/>
+          </a:stretch>
+        </p:blipFill>
+        <p:spPr>
+          <a:xfrm>
+            <a:off x="349250" y="980728"/>
+            <a:ext cx="8418512" cy="5162941"/>
+          </a:xfrm>
+        </p:spPr>
+      </p:pic>
+      <p:sp>
+        <p:nvSpPr>
+          <p:cNvPr id="8" name="Rectangle 7">
+            <a:extLst>
+              <a:ext uri="{FF2B5EF4-FFF2-40B4-BE49-F238E27FC236}">
+                <a16:creationId xmlns:a16="http://schemas.microsoft.com/office/drawing/2014/main" id="{A8719556-ED0B-AF4F-ABDE-4F6BB3D3BBD6}"/>
+              </a:ext>
+            </a:extLst>
+          </p:cNvPr>
+          <p:cNvSpPr/>
+          <p:nvPr/>
+        </p:nvSpPr>
+        <p:spPr>
+          <a:xfrm>
+            <a:off x="4283968" y="2636912"/>
+            <a:ext cx="4392488" cy="504056"/>
+          </a:xfrm>
+          <a:prstGeom prst="rect">
+            <a:avLst/>
+          </a:prstGeom>
+          <a:noFill/>
+          <a:ln w="57150">
+            <a:solidFill>
+              <a:srgbClr val="FF0000"/>
+            </a:solidFill>
+          </a:ln>
+        </p:spPr>
+        <p:style>
+          <a:lnRef idx="2">
+            <a:schemeClr val="accent1">
+              <a:shade val="50000"/>
+            </a:schemeClr>
+          </a:lnRef>
+          <a:fillRef idx="1">
+            <a:schemeClr val="accent1"/>
+          </a:fillRef>
+          <a:effectRef idx="0">
+            <a:schemeClr val="accent1"/>
+          </a:effectRef>
+          <a:fontRef idx="minor">
+            <a:schemeClr val="lt1"/>
+          </a:fontRef>
+        </p:style>
+        <p:txBody>
+          <a:bodyPr rtlCol="0" anchor="ctr"/>
+          <a:lstStyle/>
+          <a:p>
+            <a:pPr algn="ctr"/>
+            <a:endParaRPr lang="en-GB"/>
+          </a:p>
+        </p:txBody>
+      </p:sp>
+      <p:sp>
+        <p:nvSpPr>
+          <p:cNvPr id="2" name="Right Arrow 1">
+            <a:extLst>
+              <a:ext uri="{FF2B5EF4-FFF2-40B4-BE49-F238E27FC236}">
+                <a16:creationId xmlns:a16="http://schemas.microsoft.com/office/drawing/2014/main" id="{2F3CA932-4B10-E346-AE76-9609CEC56AD1}"/>
+              </a:ext>
+            </a:extLst>
+          </p:cNvPr>
+          <p:cNvSpPr/>
+          <p:nvPr/>
+        </p:nvSpPr>
+        <p:spPr>
+          <a:xfrm>
+            <a:off x="1187624" y="2242500"/>
+            <a:ext cx="2664296" cy="1319698"/>
+          </a:xfrm>
+          <a:prstGeom prst="rightArrow">
+            <a:avLst/>
+          </a:prstGeom>
+          <a:solidFill>
+            <a:srgbClr val="FF0000"/>
+          </a:solidFill>
+        </p:spPr>
+        <p:style>
+          <a:lnRef idx="2">
+            <a:schemeClr val="accent1">
+              <a:shade val="50000"/>
+            </a:schemeClr>
+          </a:lnRef>
+          <a:fillRef idx="1">
+            <a:schemeClr val="accent1"/>
+          </a:fillRef>
+          <a:effectRef idx="0">
+            <a:schemeClr val="accent1"/>
+          </a:effectRef>
+          <a:fontRef idx="minor">
+            <a:schemeClr val="lt1"/>
+          </a:fontRef>
+        </p:style>
+        <p:txBody>
+          <a:bodyPr rtlCol="0" anchor="ctr"/>
+          <a:lstStyle/>
+          <a:p>
+            <a:pPr algn="ctr"/>
+            <a:r>
+              <a:rPr lang="en-GB" dirty="0"/>
+              <a:t>Set breakpoint</a:t>
+            </a:r>
+          </a:p>
+        </p:txBody>
+      </p:sp>
+    </p:spTree>
+    <p:extLst>
+      <p:ext uri="{BB962C8B-B14F-4D97-AF65-F5344CB8AC3E}">
+        <p14:creationId xmlns:p14="http://schemas.microsoft.com/office/powerpoint/2010/main" val="2832947675"/>
+      </p:ext>
+    </p:extLst>
+  </p:cSld>
+  <p:clrMapOvr>
+    <a:masterClrMapping/>
+  </p:clrMapOvr>
+</p:sld>
+</file>
+
+<file path=ppt/slides/slide13.xml><?xml version="1.0" encoding="utf-8"?>
+<p:sld xmlns:a="http://schemas.openxmlformats.org/drawingml/2006/main" xmlns:r="http://schemas.openxmlformats.org/officeDocument/2006/relationships" xmlns:p="http://schemas.openxmlformats.org/presentationml/2006/main">
+  <p:cSld>
+    <p:spTree>
+      <p:nvGrpSpPr>
+        <p:cNvPr id="1" name=""/>
+        <p:cNvGrpSpPr/>
+        <p:nvPr/>
+      </p:nvGrpSpPr>
+      <p:grpSpPr>
+        <a:xfrm>
+          <a:off x="0" y="0"/>
+          <a:ext cx="0" cy="0"/>
+          <a:chOff x="0" y="0"/>
+          <a:chExt cx="0" cy="0"/>
+        </a:xfrm>
+      </p:grpSpPr>
+      <p:sp>
+        <p:nvSpPr>
+          <p:cNvPr id="18434" name="Title 1"/>
+          <p:cNvSpPr>
+            <a:spLocks noGrp="1"/>
+          </p:cNvSpPr>
+          <p:nvPr>
+            <p:ph type="title"/>
+          </p:nvPr>
+        </p:nvSpPr>
+        <p:spPr>
+          <a:xfrm>
+            <a:off x="391383" y="188640"/>
+            <a:ext cx="8418512" cy="881063"/>
+          </a:xfrm>
+        </p:spPr>
+        <p:txBody>
+          <a:bodyPr/>
+          <a:lstStyle/>
+          <a:p>
+            <a:pPr eaLnBrk="1" hangingPunct="1"/>
+            <a:r>
+              <a:rPr lang="en-GB" altLang="en-US" b="1" dirty="0"/>
+              <a:t>IDEs Wrap this up nicely</a:t>
+            </a:r>
+          </a:p>
+        </p:txBody>
+      </p:sp>
+      <p:pic>
+        <p:nvPicPr>
+          <p:cNvPr id="7" name="Content Placeholder 6" descr="Graphical user interface, text&#10;&#10;Description automatically generated">
+            <a:extLst>
+              <a:ext uri="{FF2B5EF4-FFF2-40B4-BE49-F238E27FC236}">
+                <a16:creationId xmlns:a16="http://schemas.microsoft.com/office/drawing/2014/main" id="{9F3C072A-6F04-804F-9C99-19479173DD5C}"/>
+              </a:ext>
+            </a:extLst>
+          </p:cNvPr>
+          <p:cNvPicPr>
+            <a:picLocks noGrp="1" noChangeAspect="1"/>
+          </p:cNvPicPr>
+          <p:nvPr>
+            <p:ph idx="1"/>
+          </p:nvPr>
+        </p:nvPicPr>
+        <p:blipFill>
+          <a:blip r:embed="rId2">
+            <a:extLst>
+              <a:ext uri="{28A0092B-C50C-407E-A947-70E740481C1C}">
+                <a14:useLocalDpi xmlns:a14="http://schemas.microsoft.com/office/drawing/2010/main" val="0"/>
+              </a:ext>
+            </a:extLst>
+          </a:blip>
+          <a:stretch>
+            <a:fillRect/>
+          </a:stretch>
+        </p:blipFill>
+        <p:spPr>
+          <a:xfrm>
+            <a:off x="349250" y="980728"/>
+            <a:ext cx="8418512" cy="5162941"/>
+          </a:xfrm>
+        </p:spPr>
+      </p:pic>
+      <p:sp>
+        <p:nvSpPr>
+          <p:cNvPr id="8" name="Rectangle 7">
+            <a:extLst>
+              <a:ext uri="{FF2B5EF4-FFF2-40B4-BE49-F238E27FC236}">
+                <a16:creationId xmlns:a16="http://schemas.microsoft.com/office/drawing/2014/main" id="{A8719556-ED0B-AF4F-ABDE-4F6BB3D3BBD6}"/>
+              </a:ext>
+            </a:extLst>
+          </p:cNvPr>
+          <p:cNvSpPr/>
+          <p:nvPr/>
+        </p:nvSpPr>
+        <p:spPr>
+          <a:xfrm>
+            <a:off x="1043608" y="4509120"/>
+            <a:ext cx="7560840" cy="792088"/>
+          </a:xfrm>
+          <a:prstGeom prst="rect">
+            <a:avLst/>
+          </a:prstGeom>
+          <a:noFill/>
+          <a:ln w="57150">
+            <a:solidFill>
+              <a:srgbClr val="FF0000"/>
+            </a:solidFill>
+          </a:ln>
+        </p:spPr>
+        <p:style>
+          <a:lnRef idx="2">
+            <a:schemeClr val="accent1">
+              <a:shade val="50000"/>
+            </a:schemeClr>
+          </a:lnRef>
+          <a:fillRef idx="1">
+            <a:schemeClr val="accent1"/>
+          </a:fillRef>
+          <a:effectRef idx="0">
+            <a:schemeClr val="accent1"/>
+          </a:effectRef>
+          <a:fontRef idx="minor">
+            <a:schemeClr val="lt1"/>
+          </a:fontRef>
+        </p:style>
+        <p:txBody>
+          <a:bodyPr rtlCol="0" anchor="ctr"/>
+          <a:lstStyle/>
+          <a:p>
+            <a:pPr algn="ctr"/>
+            <a:endParaRPr lang="en-GB"/>
+          </a:p>
+        </p:txBody>
+      </p:sp>
+      <p:sp>
+        <p:nvSpPr>
+          <p:cNvPr id="5" name="Right Arrow 4">
+            <a:extLst>
+              <a:ext uri="{FF2B5EF4-FFF2-40B4-BE49-F238E27FC236}">
+                <a16:creationId xmlns:a16="http://schemas.microsoft.com/office/drawing/2014/main" id="{00DF7ADD-D5D6-4247-826A-B46B9C86AA60}"/>
+              </a:ext>
+            </a:extLst>
+          </p:cNvPr>
+          <p:cNvSpPr/>
+          <p:nvPr/>
+        </p:nvSpPr>
+        <p:spPr>
+          <a:xfrm rot="10800000" flipV="1">
+            <a:off x="5868144" y="4245315"/>
+            <a:ext cx="2664296" cy="1319698"/>
+          </a:xfrm>
+          <a:prstGeom prst="rightArrow">
+            <a:avLst/>
+          </a:prstGeom>
+          <a:solidFill>
+            <a:srgbClr val="FF0000"/>
+          </a:solidFill>
+        </p:spPr>
+        <p:style>
+          <a:lnRef idx="2">
+            <a:schemeClr val="accent1">
+              <a:shade val="50000"/>
+            </a:schemeClr>
+          </a:lnRef>
+          <a:fillRef idx="1">
+            <a:schemeClr val="accent1"/>
+          </a:fillRef>
+          <a:effectRef idx="0">
+            <a:schemeClr val="accent1"/>
+          </a:effectRef>
+          <a:fontRef idx="minor">
+            <a:schemeClr val="lt1"/>
+          </a:fontRef>
+        </p:style>
+        <p:txBody>
+          <a:bodyPr rtlCol="0" anchor="ctr"/>
+          <a:lstStyle/>
+          <a:p>
+            <a:pPr algn="ctr"/>
+            <a:r>
+              <a:rPr lang="en-GB" dirty="0"/>
+              <a:t>Variables in scope</a:t>
+            </a:r>
+          </a:p>
+        </p:txBody>
+      </p:sp>
+    </p:spTree>
+    <p:extLst>
+      <p:ext uri="{BB962C8B-B14F-4D97-AF65-F5344CB8AC3E}">
+        <p14:creationId xmlns:p14="http://schemas.microsoft.com/office/powerpoint/2010/main" val="659627143"/>
+      </p:ext>
+    </p:extLst>
+  </p:cSld>
+  <p:clrMapOvr>
+    <a:masterClrMapping/>
+  </p:clrMapOvr>
+</p:sld>
+</file>
+
+<file path=ppt/slides/slide14.xml><?xml version="1.0" encoding="utf-8"?>
+<p:sld xmlns:a="http://schemas.openxmlformats.org/drawingml/2006/main" xmlns:r="http://schemas.openxmlformats.org/officeDocument/2006/relationships" xmlns:p="http://schemas.openxmlformats.org/presentationml/2006/main">
+  <p:cSld>
+    <p:spTree>
+      <p:nvGrpSpPr>
+        <p:cNvPr id="1" name=""/>
+        <p:cNvGrpSpPr/>
+        <p:nvPr/>
+      </p:nvGrpSpPr>
+      <p:grpSpPr>
+        <a:xfrm>
+          <a:off x="0" y="0"/>
+          <a:ext cx="0" cy="0"/>
+          <a:chOff x="0" y="0"/>
+          <a:chExt cx="0" cy="0"/>
+        </a:xfrm>
+      </p:grpSpPr>
+      <p:sp>
+        <p:nvSpPr>
+          <p:cNvPr id="18434" name="Title 1"/>
+          <p:cNvSpPr>
+            <a:spLocks noGrp="1"/>
+          </p:cNvSpPr>
+          <p:nvPr>
+            <p:ph type="title"/>
+          </p:nvPr>
+        </p:nvSpPr>
+        <p:spPr>
+          <a:xfrm>
+            <a:off x="391383" y="188640"/>
+            <a:ext cx="8418512" cy="881063"/>
+          </a:xfrm>
+        </p:spPr>
+        <p:txBody>
+          <a:bodyPr/>
+          <a:lstStyle/>
+          <a:p>
+            <a:pPr eaLnBrk="1" hangingPunct="1"/>
+            <a:r>
+              <a:rPr lang="en-GB" altLang="en-US" b="1" dirty="0"/>
+              <a:t>IDEs Wrap this up nicely</a:t>
+            </a:r>
+          </a:p>
+        </p:txBody>
+      </p:sp>
+      <p:pic>
+        <p:nvPicPr>
+          <p:cNvPr id="7" name="Content Placeholder 6" descr="Graphical user interface, text&#10;&#10;Description automatically generated">
+            <a:extLst>
+              <a:ext uri="{FF2B5EF4-FFF2-40B4-BE49-F238E27FC236}">
+                <a16:creationId xmlns:a16="http://schemas.microsoft.com/office/drawing/2014/main" id="{9F3C072A-6F04-804F-9C99-19479173DD5C}"/>
+              </a:ext>
+            </a:extLst>
+          </p:cNvPr>
+          <p:cNvPicPr>
+            <a:picLocks noGrp="1" noChangeAspect="1"/>
+          </p:cNvPicPr>
+          <p:nvPr>
+            <p:ph idx="1"/>
+          </p:nvPr>
+        </p:nvPicPr>
+        <p:blipFill>
+          <a:blip r:embed="rId2">
+            <a:extLst>
+              <a:ext uri="{28A0092B-C50C-407E-A947-70E740481C1C}">
+                <a14:useLocalDpi xmlns:a14="http://schemas.microsoft.com/office/drawing/2010/main" val="0"/>
+              </a:ext>
+            </a:extLst>
+          </a:blip>
+          <a:stretch>
+            <a:fillRect/>
+          </a:stretch>
+        </p:blipFill>
+        <p:spPr>
+          <a:xfrm>
+            <a:off x="349250" y="980728"/>
+            <a:ext cx="8418512" cy="5162941"/>
+          </a:xfrm>
+        </p:spPr>
+      </p:pic>
+      <p:sp>
+        <p:nvSpPr>
+          <p:cNvPr id="8" name="Rectangle 7">
+            <a:extLst>
+              <a:ext uri="{FF2B5EF4-FFF2-40B4-BE49-F238E27FC236}">
+                <a16:creationId xmlns:a16="http://schemas.microsoft.com/office/drawing/2014/main" id="{A8719556-ED0B-AF4F-ABDE-4F6BB3D3BBD6}"/>
+              </a:ext>
+            </a:extLst>
+          </p:cNvPr>
+          <p:cNvSpPr/>
+          <p:nvPr/>
+        </p:nvSpPr>
+        <p:spPr>
+          <a:xfrm>
+            <a:off x="1259632" y="4221088"/>
+            <a:ext cx="2592288" cy="360040"/>
+          </a:xfrm>
+          <a:prstGeom prst="rect">
+            <a:avLst/>
+          </a:prstGeom>
+          <a:noFill/>
+          <a:ln w="57150">
+            <a:solidFill>
+              <a:srgbClr val="FF0000"/>
+            </a:solidFill>
+          </a:ln>
+        </p:spPr>
+        <p:style>
+          <a:lnRef idx="2">
+            <a:schemeClr val="accent1">
+              <a:shade val="50000"/>
+            </a:schemeClr>
+          </a:lnRef>
+          <a:fillRef idx="1">
+            <a:schemeClr val="accent1"/>
+          </a:fillRef>
+          <a:effectRef idx="0">
+            <a:schemeClr val="accent1"/>
+          </a:effectRef>
+          <a:fontRef idx="minor">
+            <a:schemeClr val="lt1"/>
+          </a:fontRef>
+        </p:style>
+        <p:txBody>
+          <a:bodyPr rtlCol="0" anchor="ctr"/>
+          <a:lstStyle/>
+          <a:p>
+            <a:pPr algn="ctr"/>
+            <a:endParaRPr lang="en-GB"/>
+          </a:p>
+        </p:txBody>
+      </p:sp>
+      <p:sp>
+        <p:nvSpPr>
+          <p:cNvPr id="5" name="Right Arrow 4">
+            <a:extLst>
+              <a:ext uri="{FF2B5EF4-FFF2-40B4-BE49-F238E27FC236}">
+                <a16:creationId xmlns:a16="http://schemas.microsoft.com/office/drawing/2014/main" id="{7DE93B60-4A2E-3047-8EB4-27EE2C1A4F00}"/>
+              </a:ext>
+            </a:extLst>
+          </p:cNvPr>
+          <p:cNvSpPr/>
+          <p:nvPr/>
+        </p:nvSpPr>
+        <p:spPr>
+          <a:xfrm rot="10800000" flipV="1">
+            <a:off x="3886202" y="3657137"/>
+            <a:ext cx="2916322" cy="1487941"/>
+          </a:xfrm>
+          <a:prstGeom prst="rightArrow">
+            <a:avLst/>
+          </a:prstGeom>
+          <a:solidFill>
+            <a:srgbClr val="FF0000"/>
+          </a:solidFill>
+        </p:spPr>
+        <p:style>
+          <a:lnRef idx="2">
+            <a:schemeClr val="accent1">
+              <a:shade val="50000"/>
+            </a:schemeClr>
+          </a:lnRef>
+          <a:fillRef idx="1">
+            <a:schemeClr val="accent1"/>
+          </a:fillRef>
+          <a:effectRef idx="0">
+            <a:schemeClr val="accent1"/>
+          </a:effectRef>
+          <a:fontRef idx="minor">
+            <a:schemeClr val="lt1"/>
+          </a:fontRef>
+        </p:style>
+        <p:txBody>
+          <a:bodyPr rtlCol="0" anchor="ctr"/>
+          <a:lstStyle/>
+          <a:p>
+            <a:pPr algn="ctr"/>
+            <a:r>
+              <a:rPr lang="en-GB" dirty="0"/>
+              <a:t>Controls to step through code and explore</a:t>
+            </a:r>
+          </a:p>
+        </p:txBody>
+      </p:sp>
+    </p:spTree>
+    <p:extLst>
+      <p:ext uri="{BB962C8B-B14F-4D97-AF65-F5344CB8AC3E}">
+        <p14:creationId xmlns:p14="http://schemas.microsoft.com/office/powerpoint/2010/main" val="1348167766"/>
+      </p:ext>
+    </p:extLst>
+  </p:cSld>
+  <p:clrMapOvr>
+    <a:masterClrMapping/>
+  </p:clrMapOvr>
+</p:sld>
+</file>
+
 <file path=ppt/slides/slide2.xml><?xml version="1.0" encoding="utf-8"?>
 <p:sld xmlns:a="http://schemas.openxmlformats.org/drawingml/2006/main" xmlns:r="http://schemas.openxmlformats.org/officeDocument/2006/relationships" xmlns:p="http://schemas.openxmlformats.org/presentationml/2006/main">
   <p:cSld>
@@ -3586,7 +4267,7 @@
           <a:p>
             <a:pPr eaLnBrk="1" hangingPunct="1"/>
             <a:r>
-              <a:rPr lang="en-GB" altLang="en-US" b="1" smtClean="0"/>
+              <a:rPr lang="en-GB" altLang="en-US" b="1"/>
               <a:t>Logging</a:t>
             </a:r>
           </a:p>
@@ -3612,35 +4293,35 @@
               <a:buNone/>
             </a:pPr>
             <a:r>
-              <a:rPr lang="en-GB" altLang="en-US" smtClean="0"/>
+              <a:rPr lang="en-GB" altLang="en-US"/>
               <a:t>Python has the "logging" module which allows you to log in many useful ways:</a:t>
             </a:r>
           </a:p>
           <a:p>
             <a:pPr eaLnBrk="1" hangingPunct="1"/>
             <a:r>
-              <a:rPr lang="en-GB" altLang="en-US" smtClean="0"/>
+              <a:rPr lang="en-GB" altLang="en-US"/>
               <a:t>To the terminal</a:t>
             </a:r>
           </a:p>
           <a:p>
             <a:pPr eaLnBrk="1" hangingPunct="1"/>
             <a:r>
-              <a:rPr lang="en-GB" altLang="en-US" smtClean="0"/>
+              <a:rPr lang="en-GB" altLang="en-US"/>
               <a:t>To file(s)</a:t>
             </a:r>
           </a:p>
           <a:p>
             <a:pPr eaLnBrk="1" hangingPunct="1"/>
             <a:r>
-              <a:rPr lang="en-GB" altLang="en-US" smtClean="0"/>
+              <a:rPr lang="en-GB" altLang="en-US"/>
               <a:t>To custom-handlers (e.g. e-mail)</a:t>
             </a:r>
           </a:p>
           <a:p>
             <a:pPr eaLnBrk="1" hangingPunct="1"/>
             <a:r>
-              <a:rPr lang="en-GB" altLang="en-US" smtClean="0"/>
+              <a:rPr lang="en-GB" altLang="en-US"/>
               <a:t>To system log files</a:t>
             </a:r>
           </a:p>
@@ -3651,13 +4332,6 @@
   <p:clrMapOvr>
     <a:masterClrMapping/>
   </p:clrMapOvr>
-  <p:timing>
-    <p:tnLst>
-      <p:par>
-        <p:cTn id="1" dur="indefinite" restart="never" nodeType="tmRoot"/>
-      </p:par>
-    </p:tnLst>
-  </p:timing>
 </p:sld>
 </file>
 
@@ -3695,7 +4369,7 @@
           <a:p>
             <a:pPr eaLnBrk="1" hangingPunct="1"/>
             <a:r>
-              <a:rPr lang="en-GB" altLang="en-US" b="1" smtClean="0"/>
+              <a:rPr lang="en-GB" altLang="en-US" b="1"/>
               <a:t>Logging options</a:t>
             </a:r>
           </a:p>
@@ -3718,42 +4392,42 @@
           <a:p>
             <a:pPr eaLnBrk="1" hangingPunct="1"/>
             <a:r>
-              <a:rPr lang="en-GB" altLang="en-US" smtClean="0"/>
+              <a:rPr lang="en-GB" altLang="en-US"/>
               <a:t>You can configure:</a:t>
             </a:r>
           </a:p>
           <a:p>
             <a:pPr lvl="1" eaLnBrk="1" hangingPunct="1"/>
             <a:r>
-              <a:rPr lang="en-GB" altLang="en-US" smtClean="0"/>
+              <a:rPr lang="en-GB" altLang="en-US"/>
               <a:t>The number of loggers</a:t>
             </a:r>
           </a:p>
           <a:p>
             <a:pPr lvl="1" eaLnBrk="1" hangingPunct="1"/>
             <a:r>
-              <a:rPr lang="en-GB" altLang="en-US" smtClean="0"/>
+              <a:rPr lang="en-GB" altLang="en-US"/>
               <a:t>The format of log messages</a:t>
             </a:r>
           </a:p>
           <a:p>
             <a:pPr lvl="1" eaLnBrk="1" hangingPunct="1"/>
             <a:r>
-              <a:rPr lang="en-GB" altLang="en-US" smtClean="0"/>
+              <a:rPr lang="en-GB" altLang="en-US"/>
               <a:t>The level of ferocity with which logging should happen, e.g.:</a:t>
             </a:r>
           </a:p>
           <a:p>
             <a:pPr lvl="2" eaLnBrk="1" hangingPunct="1"/>
             <a:r>
-              <a:rPr lang="en-GB" altLang="en-US" smtClean="0"/>
+              <a:rPr lang="en-GB" altLang="en-US"/>
               <a:t>Log everything in "DEBUG" mode</a:t>
             </a:r>
           </a:p>
           <a:p>
             <a:pPr lvl="2" eaLnBrk="1" hangingPunct="1"/>
             <a:r>
-              <a:rPr lang="en-GB" altLang="en-US" smtClean="0"/>
+              <a:rPr lang="en-GB" altLang="en-US"/>
               <a:t>Only log errors in "operational" mode</a:t>
             </a:r>
           </a:p>
@@ -3764,13 +4438,6 @@
   <p:clrMapOvr>
     <a:masterClrMapping/>
   </p:clrMapOvr>
-  <p:timing>
-    <p:tnLst>
-      <p:par>
-        <p:cTn id="1" dur="indefinite" restart="never" nodeType="tmRoot"/>
-      </p:par>
-    </p:tnLst>
-  </p:timing>
 </p:sld>
 </file>
 
@@ -3808,7 +4475,7 @@
           <a:p>
             <a:pPr eaLnBrk="1" hangingPunct="1"/>
             <a:r>
-              <a:rPr lang="en-GB" altLang="en-US" b="1" smtClean="0"/>
+              <a:rPr lang="en-GB" altLang="en-US" b="1"/>
               <a:t>Alas, no time</a:t>
             </a:r>
           </a:p>
@@ -3845,7 +4512,7 @@
               <a:defRPr/>
             </a:pPr>
             <a:r>
-              <a:rPr lang="en-GB" sz="4000" dirty="0" smtClean="0"/>
+              <a:rPr lang="en-GB" sz="4000" dirty="0"/>
               <a:t>We do not have time to cover logging properly. This could get you started:</a:t>
             </a:r>
           </a:p>
@@ -3858,7 +4525,7 @@
               <a:buNone/>
               <a:defRPr/>
             </a:pPr>
-            <a:endParaRPr lang="en-GB" dirty="0" smtClean="0"/>
+            <a:endParaRPr lang="en-GB" dirty="0"/>
           </a:p>
           <a:p>
             <a:pPr eaLnBrk="1" fontAlgn="auto" hangingPunct="1">
@@ -3870,35 +4537,35 @@
               <a:defRPr/>
             </a:pPr>
             <a:r>
-              <a:rPr lang="en-GB" sz="2600" b="1" dirty="0" smtClean="0">
+              <a:rPr lang="en-GB" sz="2600" b="1" dirty="0">
                 <a:latin typeface="Courier New" panose="02070309020205020404" pitchFamily="49" charset="0"/>
                 <a:cs typeface="Courier New" panose="02070309020205020404" pitchFamily="49" charset="0"/>
               </a:rPr>
               <a:t>&gt;&gt;&gt;</a:t>
             </a:r>
             <a:r>
-              <a:rPr lang="en-GB" sz="2600" dirty="0" smtClean="0">
+              <a:rPr lang="en-GB" sz="2600" dirty="0">
                 <a:latin typeface="Courier New" panose="02070309020205020404" pitchFamily="49" charset="0"/>
                 <a:cs typeface="Courier New" panose="02070309020205020404" pitchFamily="49" charset="0"/>
               </a:rPr>
               <a:t> </a:t>
             </a:r>
             <a:r>
-              <a:rPr lang="en-GB" sz="2600" b="1" dirty="0" smtClean="0">
+              <a:rPr lang="en-GB" sz="2600" b="1" dirty="0">
                 <a:latin typeface="Courier New" panose="02070309020205020404" pitchFamily="49" charset="0"/>
                 <a:cs typeface="Courier New" panose="02070309020205020404" pitchFamily="49" charset="0"/>
               </a:rPr>
               <a:t>import</a:t>
             </a:r>
             <a:r>
-              <a:rPr lang="en-GB" sz="2600" dirty="0" smtClean="0">
+              <a:rPr lang="en-GB" sz="2600" dirty="0">
                 <a:latin typeface="Courier New" panose="02070309020205020404" pitchFamily="49" charset="0"/>
                 <a:cs typeface="Courier New" panose="02070309020205020404" pitchFamily="49" charset="0"/>
               </a:rPr>
               <a:t> sys, logging  </a:t>
             </a:r>
             <a:r>
-              <a:rPr lang="en-GB" sz="2600" dirty="0" smtClean="0">
+              <a:rPr lang="en-GB" sz="2600" dirty="0">
                 <a:solidFill>
                   <a:srgbClr val="FFC000"/>
                 </a:solidFill>
@@ -3918,56 +4585,56 @@
               <a:defRPr/>
             </a:pPr>
             <a:r>
-              <a:rPr lang="en-GB" sz="2600" b="1" dirty="0" smtClean="0">
+              <a:rPr lang="en-GB" sz="2600" b="1" dirty="0">
                 <a:latin typeface="Courier New" panose="02070309020205020404" pitchFamily="49" charset="0"/>
                 <a:cs typeface="Courier New" panose="02070309020205020404" pitchFamily="49" charset="0"/>
               </a:rPr>
               <a:t>&gt;&gt;&gt;</a:t>
             </a:r>
             <a:r>
-              <a:rPr lang="en-GB" sz="2600" dirty="0" smtClean="0">
+              <a:rPr lang="en-GB" sz="2600" dirty="0">
                 <a:latin typeface="Courier New" panose="02070309020205020404" pitchFamily="49" charset="0"/>
                 <a:cs typeface="Courier New" panose="02070309020205020404" pitchFamily="49" charset="0"/>
               </a:rPr>
               <a:t> </a:t>
             </a:r>
             <a:r>
-              <a:rPr lang="en-GB" sz="2600" dirty="0" err="1" smtClean="0">
+              <a:rPr lang="en-GB" sz="2600" dirty="0" err="1">
                 <a:latin typeface="Courier New" panose="02070309020205020404" pitchFamily="49" charset="0"/>
                 <a:cs typeface="Courier New" panose="02070309020205020404" pitchFamily="49" charset="0"/>
               </a:rPr>
               <a:t>stream_handler</a:t>
             </a:r>
             <a:r>
-              <a:rPr lang="en-GB" sz="2600" dirty="0" smtClean="0">
+              <a:rPr lang="en-GB" sz="2600" dirty="0">
                 <a:latin typeface="Courier New" panose="02070309020205020404" pitchFamily="49" charset="0"/>
                 <a:cs typeface="Courier New" panose="02070309020205020404" pitchFamily="49" charset="0"/>
               </a:rPr>
               <a:t> = </a:t>
             </a:r>
             <a:r>
-              <a:rPr lang="en-GB" sz="2600" dirty="0" err="1" smtClean="0">
+              <a:rPr lang="en-GB" sz="2600" dirty="0" err="1">
                 <a:latin typeface="Courier New" panose="02070309020205020404" pitchFamily="49" charset="0"/>
                 <a:cs typeface="Courier New" panose="02070309020205020404" pitchFamily="49" charset="0"/>
               </a:rPr>
               <a:t>logging.StreamHandler</a:t>
             </a:r>
             <a:r>
-              <a:rPr lang="en-GB" sz="2600" dirty="0" smtClean="0">
+              <a:rPr lang="en-GB" sz="2600" dirty="0">
                 <a:latin typeface="Courier New" panose="02070309020205020404" pitchFamily="49" charset="0"/>
                 <a:cs typeface="Courier New" panose="02070309020205020404" pitchFamily="49" charset="0"/>
               </a:rPr>
               <a:t>(</a:t>
             </a:r>
             <a:r>
-              <a:rPr lang="en-GB" sz="2600" dirty="0" err="1" smtClean="0">
+              <a:rPr lang="en-GB" sz="2600" dirty="0" err="1">
                 <a:latin typeface="Courier New" panose="02070309020205020404" pitchFamily="49" charset="0"/>
                 <a:cs typeface="Courier New" panose="02070309020205020404" pitchFamily="49" charset="0"/>
               </a:rPr>
               <a:t>sys.stderr</a:t>
             </a:r>
             <a:r>
-              <a:rPr lang="en-GB" sz="2600" dirty="0" smtClean="0">
+              <a:rPr lang="en-GB" sz="2600" dirty="0">
                 <a:latin typeface="Courier New" panose="02070309020205020404" pitchFamily="49" charset="0"/>
                 <a:cs typeface="Courier New" panose="02070309020205020404" pitchFamily="49" charset="0"/>
               </a:rPr>
@@ -3984,56 +4651,56 @@
               <a:defRPr/>
             </a:pPr>
             <a:r>
-              <a:rPr lang="en-GB" sz="2600" b="1" dirty="0" smtClean="0">
+              <a:rPr lang="en-GB" sz="2600" b="1" dirty="0">
                 <a:latin typeface="Courier New" panose="02070309020205020404" pitchFamily="49" charset="0"/>
                 <a:cs typeface="Courier New" panose="02070309020205020404" pitchFamily="49" charset="0"/>
               </a:rPr>
               <a:t>&gt;&gt;&gt;</a:t>
             </a:r>
             <a:r>
-              <a:rPr lang="en-GB" sz="2600" dirty="0" smtClean="0">
+              <a:rPr lang="en-GB" sz="2600" dirty="0">
                 <a:latin typeface="Courier New" panose="02070309020205020404" pitchFamily="49" charset="0"/>
                 <a:cs typeface="Courier New" panose="02070309020205020404" pitchFamily="49" charset="0"/>
               </a:rPr>
               <a:t> </a:t>
             </a:r>
             <a:r>
-              <a:rPr lang="en-GB" sz="2600" dirty="0" err="1" smtClean="0">
+              <a:rPr lang="en-GB" sz="2600" dirty="0" err="1">
                 <a:latin typeface="Courier New" panose="02070309020205020404" pitchFamily="49" charset="0"/>
                 <a:cs typeface="Courier New" panose="02070309020205020404" pitchFamily="49" charset="0"/>
               </a:rPr>
               <a:t>stream_handler.formatter</a:t>
             </a:r>
             <a:r>
-              <a:rPr lang="en-GB" sz="2600" dirty="0" smtClean="0">
+              <a:rPr lang="en-GB" sz="2600" dirty="0">
                 <a:latin typeface="Courier New" panose="02070309020205020404" pitchFamily="49" charset="0"/>
                 <a:cs typeface="Courier New" panose="02070309020205020404" pitchFamily="49" charset="0"/>
               </a:rPr>
               <a:t> = </a:t>
             </a:r>
             <a:r>
-              <a:rPr lang="en-GB" sz="2600" dirty="0" err="1" smtClean="0">
+              <a:rPr lang="en-GB" sz="2600" dirty="0" err="1">
                 <a:latin typeface="Courier New" panose="02070309020205020404" pitchFamily="49" charset="0"/>
                 <a:cs typeface="Courier New" panose="02070309020205020404" pitchFamily="49" charset="0"/>
               </a:rPr>
               <a:t>logging.Formatter</a:t>
             </a:r>
             <a:r>
-              <a:rPr lang="en-GB" sz="2600" dirty="0" smtClean="0">
+              <a:rPr lang="en-GB" sz="2600" dirty="0">
                 <a:latin typeface="Courier New" panose="02070309020205020404" pitchFamily="49" charset="0"/>
                 <a:cs typeface="Courier New" panose="02070309020205020404" pitchFamily="49" charset="0"/>
               </a:rPr>
               <a:t>(</a:t>
             </a:r>
             <a:r>
-              <a:rPr lang="en-GB" sz="2600" dirty="0" err="1" smtClean="0">
+              <a:rPr lang="en-GB" sz="2600" dirty="0" err="1">
                 <a:latin typeface="Courier New" panose="02070309020205020404" pitchFamily="49" charset="0"/>
                 <a:cs typeface="Courier New" panose="02070309020205020404" pitchFamily="49" charset="0"/>
               </a:rPr>
               <a:t>logging.BASIC_FORMAT</a:t>
             </a:r>
             <a:r>
-              <a:rPr lang="en-GB" sz="2600" dirty="0" smtClean="0">
+              <a:rPr lang="en-GB" sz="2600" dirty="0">
                 <a:latin typeface="Courier New" panose="02070309020205020404" pitchFamily="49" charset="0"/>
                 <a:cs typeface="Courier New" panose="02070309020205020404" pitchFamily="49" charset="0"/>
               </a:rPr>
@@ -4049,7 +4716,7 @@
               <a:buNone/>
               <a:defRPr/>
             </a:pPr>
-            <a:endParaRPr lang="en-GB" sz="2600" dirty="0" smtClean="0">
+            <a:endParaRPr lang="en-GB" sz="2600" dirty="0">
               <a:latin typeface="Courier New" panose="02070309020205020404" pitchFamily="49" charset="0"/>
               <a:cs typeface="Courier New" panose="02070309020205020404" pitchFamily="49" charset="0"/>
             </a:endParaRPr>
@@ -4063,7 +4730,7 @@
               <a:buNone/>
               <a:defRPr/>
             </a:pPr>
-            <a:endParaRPr lang="en-GB" sz="2600" dirty="0" smtClean="0">
+            <a:endParaRPr lang="en-GB" sz="2600" dirty="0">
               <a:latin typeface="Courier New" panose="02070309020205020404" pitchFamily="49" charset="0"/>
               <a:cs typeface="Courier New" panose="02070309020205020404" pitchFamily="49" charset="0"/>
             </a:endParaRPr>
@@ -4078,35 +4745,35 @@
               <a:defRPr/>
             </a:pPr>
             <a:r>
-              <a:rPr lang="en-GB" sz="2600" b="1" dirty="0" smtClean="0">
+              <a:rPr lang="en-GB" sz="2600" b="1" dirty="0">
                 <a:latin typeface="Courier New" panose="02070309020205020404" pitchFamily="49" charset="0"/>
                 <a:cs typeface="Courier New" panose="02070309020205020404" pitchFamily="49" charset="0"/>
               </a:rPr>
               <a:t>&gt;&gt;&gt;</a:t>
             </a:r>
             <a:r>
-              <a:rPr lang="en-GB" sz="2600" dirty="0" smtClean="0">
+              <a:rPr lang="en-GB" sz="2600" dirty="0">
                 <a:latin typeface="Courier New" panose="02070309020205020404" pitchFamily="49" charset="0"/>
                 <a:cs typeface="Courier New" panose="02070309020205020404" pitchFamily="49" charset="0"/>
               </a:rPr>
               <a:t> log = </a:t>
             </a:r>
             <a:r>
-              <a:rPr lang="en-GB" sz="2600" dirty="0" err="1" smtClean="0">
+              <a:rPr lang="en-GB" sz="2600" dirty="0" err="1">
                 <a:latin typeface="Courier New" panose="02070309020205020404" pitchFamily="49" charset="0"/>
                 <a:cs typeface="Courier New" panose="02070309020205020404" pitchFamily="49" charset="0"/>
               </a:rPr>
               <a:t>logging.getLogger</a:t>
             </a:r>
             <a:r>
-              <a:rPr lang="en-GB" sz="2600" dirty="0" smtClean="0">
-                <a:latin typeface="Courier New" panose="02070309020205020404" pitchFamily="49" charset="0"/>
-                <a:cs typeface="Courier New" panose="02070309020205020404" pitchFamily="49" charset="0"/>
-              </a:rPr>
-              <a:t>()  </a:t>
-            </a:r>
-            <a:r>
-              <a:rPr lang="en-GB" sz="2600" dirty="0" smtClean="0">
+              <a:rPr lang="en-GB" sz="2600" dirty="0">
+                <a:latin typeface="Courier New" panose="02070309020205020404" pitchFamily="49" charset="0"/>
+                <a:cs typeface="Courier New" panose="02070309020205020404" pitchFamily="49" charset="0"/>
+              </a:rPr>
+              <a:t>(__name__)  </a:t>
+            </a:r>
+            <a:r>
+              <a:rPr lang="en-GB" sz="2600" dirty="0">
                 <a:solidFill>
                   <a:srgbClr val="FFC000"/>
                 </a:solidFill>
@@ -4126,49 +4793,49 @@
               <a:defRPr/>
             </a:pPr>
             <a:r>
-              <a:rPr lang="en-GB" sz="2600" b="1" dirty="0" smtClean="0">
+              <a:rPr lang="en-GB" sz="2600" b="1" dirty="0">
                 <a:latin typeface="Courier New" panose="02070309020205020404" pitchFamily="49" charset="0"/>
                 <a:cs typeface="Courier New" panose="02070309020205020404" pitchFamily="49" charset="0"/>
               </a:rPr>
               <a:t>&gt;&gt;&gt;</a:t>
             </a:r>
             <a:r>
-              <a:rPr lang="en-GB" sz="2600" dirty="0" smtClean="0">
+              <a:rPr lang="en-GB" sz="2600" dirty="0">
                 <a:latin typeface="Courier New" panose="02070309020205020404" pitchFamily="49" charset="0"/>
                 <a:cs typeface="Courier New" panose="02070309020205020404" pitchFamily="49" charset="0"/>
               </a:rPr>
               <a:t> </a:t>
             </a:r>
             <a:r>
-              <a:rPr lang="en-GB" sz="2600" dirty="0" err="1" smtClean="0">
+              <a:rPr lang="en-GB" sz="2600" dirty="0" err="1">
                 <a:latin typeface="Courier New" panose="02070309020205020404" pitchFamily="49" charset="0"/>
                 <a:cs typeface="Courier New" panose="02070309020205020404" pitchFamily="49" charset="0"/>
               </a:rPr>
               <a:t>log.addHandler</a:t>
             </a:r>
             <a:r>
-              <a:rPr lang="en-GB" sz="2600" dirty="0" smtClean="0">
+              <a:rPr lang="en-GB" sz="2600" dirty="0">
                 <a:latin typeface="Courier New" panose="02070309020205020404" pitchFamily="49" charset="0"/>
                 <a:cs typeface="Courier New" panose="02070309020205020404" pitchFamily="49" charset="0"/>
               </a:rPr>
               <a:t>(</a:t>
             </a:r>
             <a:r>
-              <a:rPr lang="en-GB" sz="2600" dirty="0" err="1" smtClean="0">
+              <a:rPr lang="en-GB" sz="2600" dirty="0" err="1">
                 <a:latin typeface="Courier New" panose="02070309020205020404" pitchFamily="49" charset="0"/>
                 <a:cs typeface="Courier New" panose="02070309020205020404" pitchFamily="49" charset="0"/>
               </a:rPr>
               <a:t>stream_handler</a:t>
             </a:r>
             <a:r>
-              <a:rPr lang="en-GB" sz="2600" dirty="0" smtClean="0">
+              <a:rPr lang="en-GB" sz="2600" dirty="0">
                 <a:latin typeface="Courier New" panose="02070309020205020404" pitchFamily="49" charset="0"/>
                 <a:cs typeface="Courier New" panose="02070309020205020404" pitchFamily="49" charset="0"/>
               </a:rPr>
               <a:t>)  </a:t>
             </a:r>
             <a:r>
-              <a:rPr lang="en-GB" sz="2600" dirty="0" smtClean="0">
+              <a:rPr lang="en-GB" sz="2600" dirty="0">
                 <a:solidFill>
                   <a:srgbClr val="FFC000"/>
                 </a:solidFill>
@@ -4188,49 +4855,49 @@
               <a:defRPr/>
             </a:pPr>
             <a:r>
-              <a:rPr lang="en-GB" sz="2600" b="1" dirty="0" smtClean="0">
+              <a:rPr lang="en-GB" sz="2600" b="1" dirty="0">
                 <a:latin typeface="Courier New" panose="02070309020205020404" pitchFamily="49" charset="0"/>
                 <a:cs typeface="Courier New" panose="02070309020205020404" pitchFamily="49" charset="0"/>
               </a:rPr>
               <a:t>&gt;&gt;&gt;</a:t>
             </a:r>
             <a:r>
-              <a:rPr lang="en-GB" sz="2600" dirty="0" smtClean="0">
+              <a:rPr lang="en-GB" sz="2600" dirty="0">
                 <a:latin typeface="Courier New" panose="02070309020205020404" pitchFamily="49" charset="0"/>
                 <a:cs typeface="Courier New" panose="02070309020205020404" pitchFamily="49" charset="0"/>
               </a:rPr>
               <a:t> </a:t>
             </a:r>
             <a:r>
-              <a:rPr lang="en-GB" sz="2600" dirty="0" err="1" smtClean="0">
+              <a:rPr lang="en-GB" sz="2600" dirty="0" err="1">
                 <a:latin typeface="Courier New" panose="02070309020205020404" pitchFamily="49" charset="0"/>
                 <a:cs typeface="Courier New" panose="02070309020205020404" pitchFamily="49" charset="0"/>
               </a:rPr>
               <a:t>log.setLevel</a:t>
             </a:r>
             <a:r>
-              <a:rPr lang="en-GB" sz="2600" dirty="0" smtClean="0">
+              <a:rPr lang="en-GB" sz="2600" dirty="0">
                 <a:latin typeface="Courier New" panose="02070309020205020404" pitchFamily="49" charset="0"/>
                 <a:cs typeface="Courier New" panose="02070309020205020404" pitchFamily="49" charset="0"/>
               </a:rPr>
               <a:t>(</a:t>
             </a:r>
             <a:r>
-              <a:rPr lang="en-GB" sz="2600" dirty="0" err="1" smtClean="0">
+              <a:rPr lang="en-GB" sz="2600" dirty="0" err="1">
                 <a:latin typeface="Courier New" panose="02070309020205020404" pitchFamily="49" charset="0"/>
                 <a:cs typeface="Courier New" panose="02070309020205020404" pitchFamily="49" charset="0"/>
               </a:rPr>
               <a:t>logging.DEBUG</a:t>
             </a:r>
             <a:r>
-              <a:rPr lang="en-GB" sz="2600" dirty="0" smtClean="0">
+              <a:rPr lang="en-GB" sz="2600" dirty="0">
                 <a:latin typeface="Courier New" panose="02070309020205020404" pitchFamily="49" charset="0"/>
                 <a:cs typeface="Courier New" panose="02070309020205020404" pitchFamily="49" charset="0"/>
               </a:rPr>
               <a:t>)  </a:t>
             </a:r>
             <a:r>
-              <a:rPr lang="en-GB" sz="2600" dirty="0" smtClean="0">
+              <a:rPr lang="en-GB" sz="2600" dirty="0">
                 <a:solidFill>
                   <a:srgbClr val="FFC000"/>
                 </a:solidFill>
@@ -4249,7 +4916,7 @@
               <a:buNone/>
               <a:defRPr/>
             </a:pPr>
-            <a:endParaRPr lang="en-GB" sz="2600" dirty="0" smtClean="0">
+            <a:endParaRPr lang="en-GB" sz="2600" dirty="0">
               <a:latin typeface="Courier New" panose="02070309020205020404" pitchFamily="49" charset="0"/>
               <a:cs typeface="Courier New" panose="02070309020205020404" pitchFamily="49" charset="0"/>
             </a:endParaRPr>
@@ -4264,28 +4931,28 @@
               <a:defRPr/>
             </a:pPr>
             <a:r>
-              <a:rPr lang="en-GB" sz="2600" b="1" dirty="0" smtClean="0">
+              <a:rPr lang="en-GB" sz="2600" b="1" dirty="0">
                 <a:latin typeface="Courier New" panose="02070309020205020404" pitchFamily="49" charset="0"/>
                 <a:cs typeface="Courier New" panose="02070309020205020404" pitchFamily="49" charset="0"/>
               </a:rPr>
               <a:t>&gt;&gt;&gt;</a:t>
             </a:r>
             <a:r>
-              <a:rPr lang="en-GB" sz="2600" dirty="0" smtClean="0">
+              <a:rPr lang="en-GB" sz="2600" dirty="0">
                 <a:latin typeface="Courier New" panose="02070309020205020404" pitchFamily="49" charset="0"/>
                 <a:cs typeface="Courier New" panose="02070309020205020404" pitchFamily="49" charset="0"/>
               </a:rPr>
               <a:t> </a:t>
             </a:r>
             <a:r>
-              <a:rPr lang="en-GB" sz="2600" dirty="0" err="1" smtClean="0">
+              <a:rPr lang="en-GB" sz="2600" dirty="0" err="1">
                 <a:latin typeface="Courier New" panose="02070309020205020404" pitchFamily="49" charset="0"/>
                 <a:cs typeface="Courier New" panose="02070309020205020404" pitchFamily="49" charset="0"/>
               </a:rPr>
               <a:t>log.warning</a:t>
             </a:r>
             <a:r>
-              <a:rPr lang="en-GB" sz="2600" dirty="0" smtClean="0">
+              <a:rPr lang="en-GB" sz="2600" dirty="0">
                 <a:latin typeface="Courier New" panose="02070309020205020404" pitchFamily="49" charset="0"/>
                 <a:cs typeface="Courier New" panose="02070309020205020404" pitchFamily="49" charset="0"/>
               </a:rPr>
@@ -4302,16 +4969,6 @@
               <a:defRPr/>
             </a:pPr>
             <a:r>
-              <a:rPr lang="en-GB" sz="2600" b="1" dirty="0" err="1" smtClean="0">
-                <a:solidFill>
-                  <a:srgbClr val="FF0000"/>
-                </a:solidFill>
-                <a:latin typeface="Courier New" panose="02070309020205020404" pitchFamily="49" charset="0"/>
-                <a:cs typeface="Courier New" panose="02070309020205020404" pitchFamily="49" charset="0"/>
-              </a:rPr>
-              <a:t>WARNING:root:Danger</a:t>
-            </a:r>
-            <a:r>
               <a:rPr lang="en-GB" sz="2600" b="1" dirty="0">
                 <a:solidFill>
                   <a:srgbClr val="FF0000"/>
@@ -4319,17 +4976,27 @@
                 <a:latin typeface="Courier New" panose="02070309020205020404" pitchFamily="49" charset="0"/>
                 <a:cs typeface="Courier New" panose="02070309020205020404" pitchFamily="49" charset="0"/>
               </a:rPr>
-              <a:t>! Will Robinson! Danger</a:t>
-            </a:r>
-            <a:r>
-              <a:rPr lang="en-GB" sz="2600" b="1" dirty="0" smtClean="0">
+              <a:t>WARNING:&lt;</a:t>
+            </a:r>
+            <a:r>
+              <a:rPr lang="en-GB" sz="2600" b="1" dirty="0" err="1">
                 <a:solidFill>
                   <a:srgbClr val="FF0000"/>
                 </a:solidFill>
                 <a:latin typeface="Courier New" panose="02070309020205020404" pitchFamily="49" charset="0"/>
                 <a:cs typeface="Courier New" panose="02070309020205020404" pitchFamily="49" charset="0"/>
               </a:rPr>
-              <a:t>!</a:t>
+              <a:t>module_name</a:t>
+            </a:r>
+            <a:r>
+              <a:rPr lang="en-GB" sz="2600" b="1" dirty="0">
+                <a:solidFill>
+                  <a:srgbClr val="FF0000"/>
+                </a:solidFill>
+                <a:latin typeface="Courier New" panose="02070309020205020404" pitchFamily="49" charset="0"/>
+                <a:cs typeface="Courier New" panose="02070309020205020404" pitchFamily="49" charset="0"/>
+              </a:rPr>
+              <a:t>&gt;:Danger! Will Robinson! Danger!</a:t>
             </a:r>
           </a:p>
         </p:txBody>
@@ -4597,7 +5264,7 @@
           <a:p>
             <a:pPr eaLnBrk="1" hangingPunct="1"/>
             <a:r>
-              <a:rPr lang="en-GB" altLang="en-US" b="1" smtClean="0"/>
+              <a:rPr lang="en-GB" altLang="en-US" b="1" dirty="0"/>
               <a:t>Or, the shortened version</a:t>
             </a:r>
           </a:p>
@@ -4616,7 +5283,7 @@
         <p:spPr/>
         <p:txBody>
           <a:bodyPr rtlCol="0">
-            <a:normAutofit fontScale="92500" lnSpcReduction="20000"/>
+            <a:normAutofit fontScale="92500" lnSpcReduction="10000"/>
           </a:bodyPr>
           <a:lstStyle/>
           <a:p>
@@ -4629,28 +5296,28 @@
               <a:defRPr/>
             </a:pPr>
             <a:r>
-              <a:rPr lang="en-GB" sz="2400" b="1" dirty="0" smtClean="0">
+              <a:rPr lang="en-GB" sz="2400" b="1" dirty="0">
                 <a:latin typeface="Courier New" panose="02070309020205020404" pitchFamily="49" charset="0"/>
                 <a:cs typeface="Courier New" panose="02070309020205020404" pitchFamily="49" charset="0"/>
               </a:rPr>
               <a:t>&gt;&gt;&gt;</a:t>
             </a:r>
             <a:r>
-              <a:rPr lang="en-GB" sz="2400" dirty="0" smtClean="0">
+              <a:rPr lang="en-GB" sz="2400" dirty="0">
                 <a:latin typeface="Courier New" panose="02070309020205020404" pitchFamily="49" charset="0"/>
                 <a:cs typeface="Courier New" panose="02070309020205020404" pitchFamily="49" charset="0"/>
               </a:rPr>
               <a:t> </a:t>
             </a:r>
             <a:r>
-              <a:rPr lang="en-GB" sz="2400" b="1" dirty="0" smtClean="0">
+              <a:rPr lang="en-GB" sz="2400" b="1" dirty="0">
                 <a:latin typeface="Courier New" panose="02070309020205020404" pitchFamily="49" charset="0"/>
                 <a:cs typeface="Courier New" panose="02070309020205020404" pitchFamily="49" charset="0"/>
               </a:rPr>
               <a:t>import</a:t>
             </a:r>
             <a:r>
-              <a:rPr lang="en-GB" sz="2400" dirty="0" smtClean="0">
+              <a:rPr lang="en-GB" sz="2400" dirty="0">
                 <a:latin typeface="Courier New" panose="02070309020205020404" pitchFamily="49" charset="0"/>
                 <a:cs typeface="Courier New" panose="02070309020205020404" pitchFamily="49" charset="0"/>
               </a:rPr>
@@ -4667,32 +5334,46 @@
               <a:defRPr/>
             </a:pPr>
             <a:r>
-              <a:rPr lang="en-GB" sz="2400" b="1" dirty="0" smtClean="0">
+              <a:rPr lang="en-GB" sz="2400" b="1" dirty="0">
                 <a:latin typeface="Courier New" panose="02070309020205020404" pitchFamily="49" charset="0"/>
                 <a:cs typeface="Courier New" panose="02070309020205020404" pitchFamily="49" charset="0"/>
               </a:rPr>
               <a:t>&gt;&gt;&gt;</a:t>
             </a:r>
             <a:r>
-              <a:rPr lang="en-GB" sz="2400" dirty="0" smtClean="0">
+              <a:rPr lang="en-GB" sz="2400" dirty="0">
                 <a:latin typeface="Courier New" panose="02070309020205020404" pitchFamily="49" charset="0"/>
                 <a:cs typeface="Courier New" panose="02070309020205020404" pitchFamily="49" charset="0"/>
               </a:rPr>
               <a:t> </a:t>
             </a:r>
             <a:r>
-              <a:rPr lang="en-GB" sz="2400" dirty="0" err="1" smtClean="0">
+              <a:rPr lang="en-GB" sz="2400" dirty="0" err="1">
                 <a:latin typeface="Courier New" panose="02070309020205020404" pitchFamily="49" charset="0"/>
                 <a:cs typeface="Courier New" panose="02070309020205020404" pitchFamily="49" charset="0"/>
               </a:rPr>
               <a:t>logging.basicConfig</a:t>
             </a:r>
             <a:r>
-              <a:rPr lang="en-GB" sz="2400" dirty="0" smtClean="0">
-                <a:latin typeface="Courier New" panose="02070309020205020404" pitchFamily="49" charset="0"/>
-                <a:cs typeface="Courier New" panose="02070309020205020404" pitchFamily="49" charset="0"/>
-              </a:rPr>
-              <a:t>()</a:t>
+              <a:rPr lang="en-GB" sz="2400" dirty="0">
+                <a:latin typeface="Courier New" panose="02070309020205020404" pitchFamily="49" charset="0"/>
+                <a:cs typeface="Courier New" panose="02070309020205020404" pitchFamily="49" charset="0"/>
+              </a:rPr>
+              <a:t>(level=</a:t>
+            </a:r>
+            <a:r>
+              <a:rPr lang="en-GB" sz="2400" dirty="0" err="1">
+                <a:latin typeface="Courier New" panose="02070309020205020404" pitchFamily="49" charset="0"/>
+                <a:cs typeface="Courier New" panose="02070309020205020404" pitchFamily="49" charset="0"/>
+              </a:rPr>
+              <a:t>logging.INFO</a:t>
+            </a:r>
+            <a:r>
+              <a:rPr lang="en-GB" sz="2400" dirty="0">
+                <a:latin typeface="Courier New" panose="02070309020205020404" pitchFamily="49" charset="0"/>
+                <a:cs typeface="Courier New" panose="02070309020205020404" pitchFamily="49" charset="0"/>
+              </a:rPr>
+              <a:t>)</a:t>
             </a:r>
           </a:p>
           <a:p>
@@ -4705,32 +5386,32 @@
               <a:defRPr/>
             </a:pPr>
             <a:r>
-              <a:rPr lang="en-GB" sz="2400" b="1" dirty="0" smtClean="0">
+              <a:rPr lang="en-GB" sz="2400" b="1" dirty="0">
                 <a:latin typeface="Courier New" panose="02070309020205020404" pitchFamily="49" charset="0"/>
                 <a:cs typeface="Courier New" panose="02070309020205020404" pitchFamily="49" charset="0"/>
               </a:rPr>
               <a:t>&gt;&gt;&gt;</a:t>
             </a:r>
             <a:r>
-              <a:rPr lang="en-GB" sz="2400" dirty="0" smtClean="0">
+              <a:rPr lang="en-GB" sz="2400" dirty="0">
                 <a:latin typeface="Courier New" panose="02070309020205020404" pitchFamily="49" charset="0"/>
                 <a:cs typeface="Courier New" panose="02070309020205020404" pitchFamily="49" charset="0"/>
               </a:rPr>
               <a:t> log = </a:t>
             </a:r>
             <a:r>
-              <a:rPr lang="en-GB" sz="2400" dirty="0" err="1" smtClean="0">
+              <a:rPr lang="en-GB" sz="2400" dirty="0" err="1">
                 <a:latin typeface="Courier New" panose="02070309020205020404" pitchFamily="49" charset="0"/>
                 <a:cs typeface="Courier New" panose="02070309020205020404" pitchFamily="49" charset="0"/>
               </a:rPr>
               <a:t>logging.getLogger</a:t>
             </a:r>
             <a:r>
-              <a:rPr lang="en-GB" sz="2400" dirty="0" smtClean="0">
-                <a:latin typeface="Courier New" panose="02070309020205020404" pitchFamily="49" charset="0"/>
-                <a:cs typeface="Courier New" panose="02070309020205020404" pitchFamily="49" charset="0"/>
-              </a:rPr>
-              <a:t>()</a:t>
+              <a:rPr lang="en-GB" sz="2400" dirty="0">
+                <a:latin typeface="Courier New" panose="02070309020205020404" pitchFamily="49" charset="0"/>
+                <a:cs typeface="Courier New" panose="02070309020205020404" pitchFamily="49" charset="0"/>
+              </a:rPr>
+              <a:t>(__name__)</a:t>
             </a:r>
           </a:p>
           <a:p>
@@ -4743,32 +5424,18 @@
               <a:defRPr/>
             </a:pPr>
             <a:r>
-              <a:rPr lang="en-GB" sz="2400" b="1" dirty="0" smtClean="0">
+              <a:rPr lang="en-GB" sz="2400" b="1" dirty="0">
                 <a:latin typeface="Courier New" panose="02070309020205020404" pitchFamily="49" charset="0"/>
                 <a:cs typeface="Courier New" panose="02070309020205020404" pitchFamily="49" charset="0"/>
               </a:rPr>
               <a:t>&gt;&gt;&gt;</a:t>
             </a:r>
             <a:r>
-              <a:rPr lang="en-GB" sz="2400" dirty="0" smtClean="0">
-                <a:latin typeface="Courier New" panose="02070309020205020404" pitchFamily="49" charset="0"/>
-                <a:cs typeface="Courier New" panose="02070309020205020404" pitchFamily="49" charset="0"/>
-              </a:rPr>
-              <a:t> </a:t>
-            </a:r>
-            <a:r>
-              <a:rPr lang="en-GB" sz="2400" dirty="0" err="1" smtClean="0">
-                <a:latin typeface="Courier New" panose="02070309020205020404" pitchFamily="49" charset="0"/>
-                <a:cs typeface="Courier New" panose="02070309020205020404" pitchFamily="49" charset="0"/>
-              </a:rPr>
-              <a:t>log.setLevel</a:t>
-            </a:r>
-            <a:r>
-              <a:rPr lang="en-GB" sz="2400" dirty="0" smtClean="0">
-                <a:latin typeface="Courier New" panose="02070309020205020404" pitchFamily="49" charset="0"/>
-                <a:cs typeface="Courier New" panose="02070309020205020404" pitchFamily="49" charset="0"/>
-              </a:rPr>
-              <a:t>(logging.INFO)</a:t>
+              <a:rPr lang="en-GB" sz="2400" dirty="0">
+                <a:latin typeface="Courier New" panose="02070309020205020404" pitchFamily="49" charset="0"/>
+                <a:cs typeface="Courier New" panose="02070309020205020404" pitchFamily="49" charset="0"/>
+              </a:rPr>
+              <a:t> log.info("The system is running")</a:t>
             </a:r>
           </a:p>
           <a:p>
@@ -4781,18 +5448,24 @@
               <a:defRPr/>
             </a:pPr>
             <a:r>
-              <a:rPr lang="en-GB" sz="2400" b="1" dirty="0" smtClean="0">
-                <a:latin typeface="Courier New" panose="02070309020205020404" pitchFamily="49" charset="0"/>
-                <a:cs typeface="Courier New" panose="02070309020205020404" pitchFamily="49" charset="0"/>
-              </a:rPr>
-              <a:t>&gt;&gt;&gt;</a:t>
-            </a:r>
-            <a:r>
-              <a:rPr lang="en-GB" sz="2400" dirty="0" smtClean="0">
-                <a:latin typeface="Courier New" panose="02070309020205020404" pitchFamily="49" charset="0"/>
-                <a:cs typeface="Courier New" panose="02070309020205020404" pitchFamily="49" charset="0"/>
-              </a:rPr>
-              <a:t> log.info("The system is running")</a:t>
+              <a:rPr lang="en-GB" sz="2400" b="1" dirty="0" err="1">
+                <a:solidFill>
+                  <a:srgbClr val="FF0000"/>
+                </a:solidFill>
+                <a:latin typeface="Courier New" panose="02070309020205020404" pitchFamily="49" charset="0"/>
+                <a:cs typeface="Courier New" panose="02070309020205020404" pitchFamily="49" charset="0"/>
+              </a:rPr>
+              <a:t>INFO:root:The</a:t>
+            </a:r>
+            <a:r>
+              <a:rPr lang="en-GB" sz="2400" b="1" dirty="0">
+                <a:solidFill>
+                  <a:srgbClr val="FF0000"/>
+                </a:solidFill>
+                <a:latin typeface="Courier New" panose="02070309020205020404" pitchFamily="49" charset="0"/>
+                <a:cs typeface="Courier New" panose="02070309020205020404" pitchFamily="49" charset="0"/>
+              </a:rPr>
+              <a:t> system is running.</a:t>
             </a:r>
           </a:p>
           <a:p>
@@ -4804,37 +5477,7 @@
               <a:buNone/>
               <a:defRPr/>
             </a:pPr>
-            <a:r>
-              <a:rPr lang="en-GB" sz="2400" b="1" dirty="0" err="1" smtClean="0">
-                <a:solidFill>
-                  <a:srgbClr val="FF0000"/>
-                </a:solidFill>
-                <a:latin typeface="Courier New" panose="02070309020205020404" pitchFamily="49" charset="0"/>
-                <a:cs typeface="Courier New" panose="02070309020205020404" pitchFamily="49" charset="0"/>
-              </a:rPr>
-              <a:t>INFO:root:The</a:t>
-            </a:r>
-            <a:r>
-              <a:rPr lang="en-GB" sz="2400" b="1" dirty="0" smtClean="0">
-                <a:solidFill>
-                  <a:srgbClr val="FF0000"/>
-                </a:solidFill>
-                <a:latin typeface="Courier New" panose="02070309020205020404" pitchFamily="49" charset="0"/>
-                <a:cs typeface="Courier New" panose="02070309020205020404" pitchFamily="49" charset="0"/>
-              </a:rPr>
-              <a:t> system is running.</a:t>
-            </a:r>
-          </a:p>
-          <a:p>
-            <a:pPr eaLnBrk="1" fontAlgn="auto" hangingPunct="1">
-              <a:spcAft>
-                <a:spcPts val="0"/>
-              </a:spcAft>
-              <a:buFont typeface="Arial" panose="020B0604020202020204" pitchFamily="34" charset="0"/>
-              <a:buNone/>
-              <a:defRPr/>
-            </a:pPr>
-            <a:endParaRPr lang="en-GB" sz="2400" b="1" dirty="0" smtClean="0">
+            <a:endParaRPr lang="en-GB" sz="2400" b="1" dirty="0">
               <a:solidFill>
                 <a:srgbClr val="002060"/>
               </a:solidFill>
@@ -4852,35 +5495,35 @@
               <a:defRPr/>
             </a:pPr>
             <a:r>
-              <a:rPr lang="en-GB" sz="2400" b="1" dirty="0" smtClean="0">
+              <a:rPr lang="en-GB" sz="2400" b="1" dirty="0">
                 <a:latin typeface="Courier New" panose="02070309020205020404" pitchFamily="49" charset="0"/>
                 <a:cs typeface="Courier New" panose="02070309020205020404" pitchFamily="49" charset="0"/>
               </a:rPr>
               <a:t>&gt;&gt;&gt;</a:t>
             </a:r>
             <a:r>
-              <a:rPr lang="en-GB" sz="2400" dirty="0" smtClean="0">
+              <a:rPr lang="en-GB" sz="2400" dirty="0">
                 <a:latin typeface="Courier New" panose="02070309020205020404" pitchFamily="49" charset="0"/>
                 <a:cs typeface="Courier New" panose="02070309020205020404" pitchFamily="49" charset="0"/>
               </a:rPr>
               <a:t> </a:t>
             </a:r>
             <a:r>
-              <a:rPr lang="en-GB" sz="2400" dirty="0" err="1" smtClean="0">
+              <a:rPr lang="en-GB" sz="2400" dirty="0" err="1">
                 <a:latin typeface="Courier New" panose="02070309020205020404" pitchFamily="49" charset="0"/>
                 <a:cs typeface="Courier New" panose="02070309020205020404" pitchFamily="49" charset="0"/>
               </a:rPr>
               <a:t>log.debug</a:t>
             </a:r>
             <a:r>
-              <a:rPr lang="en-GB" sz="2400" dirty="0" smtClean="0">
+              <a:rPr lang="en-GB" sz="2400" dirty="0">
                 <a:latin typeface="Courier New" panose="02070309020205020404" pitchFamily="49" charset="0"/>
                 <a:cs typeface="Courier New" panose="02070309020205020404" pitchFamily="49" charset="0"/>
               </a:rPr>
               <a:t>("Nothing said") </a:t>
             </a:r>
             <a:r>
-              <a:rPr lang="en-GB" sz="2400" dirty="0" smtClean="0">
+              <a:rPr lang="en-GB" sz="2400" dirty="0">
                 <a:solidFill>
                   <a:srgbClr val="FFC000"/>
                 </a:solidFill>
@@ -4907,17 +5550,7 @@
                 <a:latin typeface="Courier New" panose="02070309020205020404" pitchFamily="49" charset="0"/>
                 <a:cs typeface="Courier New" panose="02070309020205020404" pitchFamily="49" charset="0"/>
               </a:rPr>
-              <a:t> </a:t>
-            </a:r>
-            <a:r>
-              <a:rPr lang="en-GB" sz="2400" dirty="0" smtClean="0">
-                <a:solidFill>
-                  <a:srgbClr val="FFC000"/>
-                </a:solidFill>
-                <a:latin typeface="Courier New" panose="02070309020205020404" pitchFamily="49" charset="0"/>
-                <a:cs typeface="Courier New" panose="02070309020205020404" pitchFamily="49" charset="0"/>
-              </a:rPr>
-              <a:t>          because logging at lower than</a:t>
+              <a:t>           because logging at lower than</a:t>
             </a:r>
           </a:p>
           <a:p>
@@ -4937,17 +5570,7 @@
                 <a:latin typeface="Courier New" panose="02070309020205020404" pitchFamily="49" charset="0"/>
                 <a:cs typeface="Courier New" panose="02070309020205020404" pitchFamily="49" charset="0"/>
               </a:rPr>
-              <a:t> </a:t>
-            </a:r>
-            <a:r>
-              <a:rPr lang="en-GB" sz="2400" dirty="0" smtClean="0">
-                <a:solidFill>
-                  <a:srgbClr val="FFC000"/>
-                </a:solidFill>
-                <a:latin typeface="Courier New" panose="02070309020205020404" pitchFamily="49" charset="0"/>
-                <a:cs typeface="Courier New" panose="02070309020205020404" pitchFamily="49" charset="0"/>
-              </a:rPr>
-              <a:t>          priority level</a:t>
+              <a:t>           priority level</a:t>
             </a:r>
           </a:p>
           <a:p>
@@ -4960,34 +5583,34 @@
               <a:defRPr/>
             </a:pPr>
             <a:r>
-              <a:rPr lang="en-GB" sz="2400" b="1" dirty="0" smtClean="0">
+              <a:rPr lang="en-GB" sz="2400" b="1" dirty="0">
                 <a:latin typeface="Courier New" panose="02070309020205020404" pitchFamily="49" charset="0"/>
                 <a:cs typeface="Courier New" panose="02070309020205020404" pitchFamily="49" charset="0"/>
               </a:rPr>
               <a:t>&gt;&gt;&gt;</a:t>
             </a:r>
             <a:r>
-              <a:rPr lang="en-GB" sz="2400" dirty="0" smtClean="0">
+              <a:rPr lang="en-GB" sz="2400" dirty="0">
                 <a:latin typeface="Courier New" panose="02070309020205020404" pitchFamily="49" charset="0"/>
                 <a:cs typeface="Courier New" panose="02070309020205020404" pitchFamily="49" charset="0"/>
               </a:rPr>
               <a:t> </a:t>
             </a:r>
             <a:r>
-              <a:rPr lang="en-GB" sz="2400" dirty="0" err="1" smtClean="0">
+              <a:rPr lang="en-GB" sz="2400" dirty="0" err="1">
                 <a:latin typeface="Courier New" panose="02070309020205020404" pitchFamily="49" charset="0"/>
                 <a:cs typeface="Courier New" panose="02070309020205020404" pitchFamily="49" charset="0"/>
               </a:rPr>
               <a:t>log.error</a:t>
             </a:r>
             <a:r>
-              <a:rPr lang="en-GB" sz="2400" dirty="0" smtClean="0">
+              <a:rPr lang="en-GB" sz="2400" dirty="0">
                 <a:latin typeface="Courier New" panose="02070309020205020404" pitchFamily="49" charset="0"/>
                 <a:cs typeface="Courier New" panose="02070309020205020404" pitchFamily="49" charset="0"/>
               </a:rPr>
               <a:t>("Now it's serious!")</a:t>
             </a:r>
-            <a:endParaRPr lang="en-GB" sz="2400" b="1" dirty="0" smtClean="0">
+            <a:endParaRPr lang="en-GB" sz="2400" b="1" dirty="0">
               <a:solidFill>
                 <a:srgbClr val="00B050"/>
               </a:solidFill>
@@ -5005,24 +5628,34 @@
               <a:defRPr/>
             </a:pPr>
             <a:r>
-              <a:rPr lang="en-GB" sz="2400" b="1" dirty="0" err="1" smtClean="0">
+              <a:rPr lang="en-GB" sz="2400" b="1" dirty="0">
                 <a:solidFill>
                   <a:srgbClr val="FF0000"/>
                 </a:solidFill>
                 <a:latin typeface="Courier New" panose="02070309020205020404" pitchFamily="49" charset="0"/>
                 <a:cs typeface="Courier New" panose="02070309020205020404" pitchFamily="49" charset="0"/>
               </a:rPr>
-              <a:t>ERROR:root:Now</a:t>
-            </a:r>
-            <a:r>
-              <a:rPr lang="en-GB" sz="2400" b="1" dirty="0" smtClean="0">
+              <a:t>ERROR:&lt;</a:t>
+            </a:r>
+            <a:r>
+              <a:rPr lang="en-GB" sz="2400" b="1" dirty="0" err="1">
                 <a:solidFill>
                   <a:srgbClr val="FF0000"/>
                 </a:solidFill>
                 <a:latin typeface="Courier New" panose="02070309020205020404" pitchFamily="49" charset="0"/>
                 <a:cs typeface="Courier New" panose="02070309020205020404" pitchFamily="49" charset="0"/>
               </a:rPr>
-              <a:t> it's serious!</a:t>
+              <a:t>module_name</a:t>
+            </a:r>
+            <a:r>
+              <a:rPr lang="en-GB" sz="2400" b="1" dirty="0">
+                <a:solidFill>
+                  <a:srgbClr val="FF0000"/>
+                </a:solidFill>
+                <a:latin typeface="Courier New" panose="02070309020205020404" pitchFamily="49" charset="0"/>
+                <a:cs typeface="Courier New" panose="02070309020205020404" pitchFamily="49" charset="0"/>
+              </a:rPr>
+              <a:t>&gt;:Now it's serious!</a:t>
             </a:r>
           </a:p>
         </p:txBody>
@@ -5068,7 +5701,7 @@
                                         <p:tgtEl>
                                           <p:spTgt spid="3">
                                             <p:txEl>
-                                              <p:pRg st="7" end="7"/>
+                                              <p:pRg st="6" end="6"/>
                                             </p:txEl>
                                           </p:spTgt>
                                         </p:tgtEl>
@@ -5099,7 +5732,7 @@
                                         <p:tgtEl>
                                           <p:spTgt spid="3">
                                             <p:txEl>
-                                              <p:pRg st="8" end="8"/>
+                                              <p:pRg st="7" end="7"/>
                                             </p:txEl>
                                           </p:spTgt>
                                         </p:tgtEl>
@@ -5130,7 +5763,7 @@
                                         <p:tgtEl>
                                           <p:spTgt spid="3">
                                             <p:txEl>
-                                              <p:pRg st="9" end="9"/>
+                                              <p:pRg st="8" end="8"/>
                                             </p:txEl>
                                           </p:spTgt>
                                         </p:tgtEl>
@@ -5179,7 +5812,7 @@
                                         <p:tgtEl>
                                           <p:spTgt spid="3">
                                             <p:txEl>
-                                              <p:pRg st="10" end="10"/>
+                                              <p:pRg st="9" end="9"/>
                                             </p:txEl>
                                           </p:spTgt>
                                         </p:tgtEl>
@@ -5210,7 +5843,7 @@
                                         <p:tgtEl>
                                           <p:spTgt spid="3">
                                             <p:txEl>
-                                              <p:pRg st="11" end="11"/>
+                                              <p:pRg st="10" end="10"/>
                                             </p:txEl>
                                           </p:spTgt>
                                         </p:tgtEl>
@@ -5290,7 +5923,7 @@
           <a:p>
             <a:pPr eaLnBrk="1" hangingPunct="1"/>
             <a:r>
-              <a:rPr lang="en-GB" altLang="en-US" b="1" smtClean="0"/>
+              <a:rPr lang="en-GB" altLang="en-US" b="1"/>
               <a:t>What is the python debugger?</a:t>
             </a:r>
           </a:p>
@@ -5321,7 +5954,7 @@
               <a:buNone/>
             </a:pPr>
             <a:r>
-              <a:rPr lang="en-GB" altLang="en-US" smtClean="0"/>
+              <a:rPr lang="en-GB" altLang="en-US"/>
               <a:t>We all write code with bugs in...that is why it is important to write tests for our code.</a:t>
             </a:r>
           </a:p>
@@ -5331,28 +5964,28 @@
               <a:buNone/>
             </a:pPr>
             <a:r>
-              <a:rPr lang="en-GB" altLang="en-US" smtClean="0"/>
+              <a:rPr lang="en-GB" altLang="en-US"/>
               <a:t>The python debugger is a tool that allows you to:</a:t>
             </a:r>
           </a:p>
           <a:p>
             <a:pPr eaLnBrk="1" hangingPunct="1"/>
             <a:r>
-              <a:rPr lang="en-GB" altLang="en-US" sz="2400" smtClean="0"/>
+              <a:rPr lang="en-GB" altLang="en-US" sz="2400"/>
               <a:t>Run through your code interactively;</a:t>
             </a:r>
           </a:p>
           <a:p>
             <a:pPr eaLnBrk="1" hangingPunct="1"/>
             <a:r>
-              <a:rPr lang="en-GB" altLang="en-US" sz="2400" smtClean="0"/>
+              <a:rPr lang="en-GB" altLang="en-US" sz="2400"/>
               <a:t>Inspect/change the variables at run-time;</a:t>
             </a:r>
           </a:p>
           <a:p>
             <a:pPr eaLnBrk="1" hangingPunct="1"/>
             <a:r>
-              <a:rPr lang="en-GB" altLang="en-US" sz="2400" smtClean="0"/>
+              <a:rPr lang="en-GB" altLang="en-US" sz="2400"/>
               <a:t>Set "break points" in the code where you can step in and examine the state.</a:t>
             </a:r>
           </a:p>
@@ -5361,7 +5994,7 @@
               <a:buFont typeface="Arial" panose="020B0604020202020204" pitchFamily="34" charset="0"/>
               <a:buNone/>
             </a:pPr>
-            <a:endParaRPr lang="en-GB" altLang="en-US" sz="1100" smtClean="0"/>
+            <a:endParaRPr lang="en-GB" altLang="en-US" sz="1100"/>
           </a:p>
           <a:p>
             <a:pPr eaLnBrk="1" hangingPunct="1">
@@ -5369,13 +6002,13 @@
               <a:buNone/>
             </a:pPr>
             <a:r>
-              <a:rPr lang="en-GB" altLang="en-US" i="1" smtClean="0"/>
+              <a:rPr lang="en-GB" altLang="en-US" i="1"/>
               <a:t>Best illustrated through an example...</a:t>
             </a:r>
           </a:p>
           <a:p>
             <a:pPr eaLnBrk="1" hangingPunct="1"/>
-            <a:endParaRPr lang="en-GB" altLang="en-US" smtClean="0"/>
+            <a:endParaRPr lang="en-GB" altLang="en-US"/>
           </a:p>
         </p:txBody>
       </p:sp>
@@ -5611,7 +6244,7 @@
           <a:p>
             <a:pPr eaLnBrk="1" hangingPunct="1"/>
             <a:r>
-              <a:rPr lang="en-GB" altLang="en-US" b="1" smtClean="0"/>
+              <a:rPr lang="en-GB" altLang="en-US" b="1"/>
               <a:t>A simple script</a:t>
             </a:r>
           </a:p>
@@ -5636,7 +6269,7 @@
               <a:buFont typeface="Arial" panose="020B0604020202020204" pitchFamily="34" charset="0"/>
               <a:buNone/>
             </a:pPr>
-            <a:endParaRPr lang="en-GB" altLang="en-US" smtClean="0"/>
+            <a:endParaRPr lang="en-GB" altLang="en-US"/>
           </a:p>
           <a:p>
             <a:pPr eaLnBrk="1" hangingPunct="1">
@@ -5644,14 +6277,14 @@
               <a:buNone/>
             </a:pPr>
             <a:r>
-              <a:rPr lang="en-GB" altLang="en-US" sz="2400" b="1" smtClean="0">
+              <a:rPr lang="en-GB" altLang="en-US" sz="2400" b="1">
                 <a:latin typeface="Courier New" panose="02070309020205020404" pitchFamily="49" charset="0"/>
                 <a:cs typeface="Courier New" panose="02070309020205020404" pitchFamily="49" charset="0"/>
               </a:rPr>
               <a:t>def</a:t>
             </a:r>
             <a:r>
-              <a:rPr lang="en-GB" altLang="en-US" sz="2400" smtClean="0">
+              <a:rPr lang="en-GB" altLang="en-US" sz="2400">
                 <a:latin typeface="Courier New" panose="02070309020205020404" pitchFamily="49" charset="0"/>
                 <a:cs typeface="Courier New" panose="02070309020205020404" pitchFamily="49" charset="0"/>
               </a:rPr>
@@ -5664,7 +6297,7 @@
               <a:buNone/>
             </a:pPr>
             <a:r>
-              <a:rPr lang="en-GB" altLang="en-US" sz="2400" smtClean="0">
+              <a:rPr lang="en-GB" altLang="en-US" sz="2400">
                 <a:latin typeface="Courier New" panose="02070309020205020404" pitchFamily="49" charset="0"/>
                 <a:cs typeface="Courier New" panose="02070309020205020404" pitchFamily="49" charset="0"/>
               </a:rPr>
@@ -5677,21 +6310,21 @@
               <a:buNone/>
             </a:pPr>
             <a:r>
-              <a:rPr lang="en-GB" altLang="en-US" sz="2400" smtClean="0">
+              <a:rPr lang="en-GB" altLang="en-US" sz="2400">
                 <a:latin typeface="Courier New" panose="02070309020205020404" pitchFamily="49" charset="0"/>
                 <a:cs typeface="Courier New" panose="02070309020205020404" pitchFamily="49" charset="0"/>
               </a:rPr>
               <a:t>    </a:t>
             </a:r>
             <a:r>
-              <a:rPr lang="en-GB" altLang="en-US" sz="2400" b="1" smtClean="0">
+              <a:rPr lang="en-GB" altLang="en-US" sz="2400" b="1">
                 <a:latin typeface="Courier New" panose="02070309020205020404" pitchFamily="49" charset="0"/>
                 <a:cs typeface="Courier New" panose="02070309020205020404" pitchFamily="49" charset="0"/>
               </a:rPr>
               <a:t>return</a:t>
             </a:r>
             <a:r>
-              <a:rPr lang="en-GB" altLang="en-US" sz="2400" smtClean="0">
+              <a:rPr lang="en-GB" altLang="en-US" sz="2400">
                 <a:latin typeface="Courier New" panose="02070309020205020404" pitchFamily="49" charset="0"/>
                 <a:cs typeface="Courier New" panose="02070309020205020404" pitchFamily="49" charset="0"/>
               </a:rPr>
@@ -5703,7 +6336,7 @@
               <a:buFont typeface="Arial" panose="020B0604020202020204" pitchFamily="34" charset="0"/>
               <a:buNone/>
             </a:pPr>
-            <a:endParaRPr lang="en-GB" altLang="en-US" sz="2400" smtClean="0">
+            <a:endParaRPr lang="en-GB" altLang="en-US" sz="2400">
               <a:latin typeface="Courier New" panose="02070309020205020404" pitchFamily="49" charset="0"/>
               <a:cs typeface="Courier New" panose="02070309020205020404" pitchFamily="49" charset="0"/>
             </a:endParaRPr>
@@ -5714,7 +6347,7 @@
               <a:buNone/>
             </a:pPr>
             <a:r>
-              <a:rPr lang="en-GB" altLang="en-US" sz="2400" smtClean="0">
+              <a:rPr lang="en-GB" altLang="en-US" sz="2400">
                 <a:solidFill>
                   <a:srgbClr val="FFC000"/>
                 </a:solidFill>
@@ -5730,7 +6363,7 @@
               <a:buNone/>
             </a:pPr>
             <a:r>
-              <a:rPr lang="en-GB" altLang="en-US" sz="2400" smtClean="0">
+              <a:rPr lang="en-GB" altLang="en-US" sz="2400">
                 <a:latin typeface="Courier New" panose="02070309020205020404" pitchFamily="49" charset="0"/>
                 <a:cs typeface="Courier New" panose="02070309020205020404" pitchFamily="49" charset="0"/>
               </a:rPr>
@@ -5743,28 +6376,28 @@
               <a:buNone/>
             </a:pPr>
             <a:r>
-              <a:rPr lang="en-GB" altLang="en-US" sz="2400" b="1" smtClean="0">
+              <a:rPr lang="en-GB" altLang="en-US" sz="2400" b="1">
                 <a:latin typeface="Courier New" panose="02070309020205020404" pitchFamily="49" charset="0"/>
                 <a:cs typeface="Courier New" panose="02070309020205020404" pitchFamily="49" charset="0"/>
               </a:rPr>
               <a:t>for</a:t>
             </a:r>
             <a:r>
-              <a:rPr lang="en-GB" altLang="en-US" sz="2400" smtClean="0">
+              <a:rPr lang="en-GB" altLang="en-US" sz="2400">
                 <a:latin typeface="Courier New" panose="02070309020205020404" pitchFamily="49" charset="0"/>
                 <a:cs typeface="Courier New" panose="02070309020205020404" pitchFamily="49" charset="0"/>
               </a:rPr>
               <a:t> i </a:t>
             </a:r>
             <a:r>
-              <a:rPr lang="en-GB" altLang="en-US" sz="2400" b="1" smtClean="0">
+              <a:rPr lang="en-GB" altLang="en-US" sz="2400" b="1">
                 <a:latin typeface="Courier New" panose="02070309020205020404" pitchFamily="49" charset="0"/>
                 <a:cs typeface="Courier New" panose="02070309020205020404" pitchFamily="49" charset="0"/>
               </a:rPr>
               <a:t>in</a:t>
             </a:r>
             <a:r>
-              <a:rPr lang="en-GB" altLang="en-US" sz="2400" smtClean="0">
+              <a:rPr lang="en-GB" altLang="en-US" sz="2400">
                 <a:latin typeface="Courier New" panose="02070309020205020404" pitchFamily="49" charset="0"/>
                 <a:cs typeface="Courier New" panose="02070309020205020404" pitchFamily="49" charset="0"/>
               </a:rPr>
@@ -5777,21 +6410,21 @@
               <a:buNone/>
             </a:pPr>
             <a:r>
-              <a:rPr lang="en-GB" altLang="en-US" sz="2400" smtClean="0">
+              <a:rPr lang="en-GB" altLang="en-US" sz="2400">
                 <a:latin typeface="Courier New" panose="02070309020205020404" pitchFamily="49" charset="0"/>
                 <a:cs typeface="Courier New" panose="02070309020205020404" pitchFamily="49" charset="0"/>
               </a:rPr>
               <a:t>    </a:t>
             </a:r>
             <a:r>
-              <a:rPr lang="en-GB" altLang="en-US" sz="2400" b="1" smtClean="0">
+              <a:rPr lang="en-GB" altLang="en-US" sz="2400" b="1">
                 <a:latin typeface="Courier New" panose="02070309020205020404" pitchFamily="49" charset="0"/>
                 <a:cs typeface="Courier New" panose="02070309020205020404" pitchFamily="49" charset="0"/>
               </a:rPr>
               <a:t>print</a:t>
             </a:r>
             <a:r>
-              <a:rPr lang="en-GB" altLang="en-US" sz="2400" smtClean="0">
+              <a:rPr lang="en-GB" altLang="en-US" sz="2400">
                 <a:latin typeface="Courier New" panose="02070309020205020404" pitchFamily="49" charset="0"/>
                 <a:cs typeface="Courier New" panose="02070309020205020404" pitchFamily="49" charset="0"/>
               </a:rPr>
@@ -5856,13 +6489,6 @@
   <p:clrMapOvr>
     <a:masterClrMapping/>
   </p:clrMapOvr>
-  <p:timing>
-    <p:tnLst>
-      <p:par>
-        <p:cTn id="1" dur="indefinite" restart="never" nodeType="tmRoot"/>
-      </p:par>
-    </p:tnLst>
-  </p:timing>
 </p:sld>
 </file>
 
@@ -5900,7 +6526,7 @@
           <a:p>
             <a:pPr eaLnBrk="1" hangingPunct="1"/>
             <a:r>
-              <a:rPr lang="en-GB" altLang="en-US" b="1" smtClean="0"/>
+              <a:rPr lang="en-GB" altLang="en-US" b="1"/>
               <a:t>A simple script – with debugger</a:t>
             </a:r>
           </a:p>
@@ -5931,21 +6557,21 @@
               <a:buNone/>
             </a:pPr>
             <a:r>
-              <a:rPr lang="en-GB" altLang="en-US" sz="2000" b="1" smtClean="0">
+              <a:rPr lang="en-GB" altLang="en-US" sz="2000" b="1">
                 <a:latin typeface="Courier New" panose="02070309020205020404" pitchFamily="49" charset="0"/>
                 <a:cs typeface="Courier New" panose="02070309020205020404" pitchFamily="49" charset="0"/>
               </a:rPr>
               <a:t>import</a:t>
             </a:r>
             <a:r>
-              <a:rPr lang="en-GB" altLang="en-US" sz="2000" smtClean="0">
+              <a:rPr lang="en-GB" altLang="en-US" sz="2000">
                 <a:latin typeface="Courier New" panose="02070309020205020404" pitchFamily="49" charset="0"/>
                 <a:cs typeface="Courier New" panose="02070309020205020404" pitchFamily="49" charset="0"/>
               </a:rPr>
               <a:t> pdb                   </a:t>
             </a:r>
             <a:r>
-              <a:rPr lang="en-GB" altLang="en-US" sz="2000" smtClean="0">
+              <a:rPr lang="en-GB" altLang="en-US" sz="2000">
                 <a:solidFill>
                   <a:srgbClr val="FFC000"/>
                 </a:solidFill>
@@ -5960,7 +6586,7 @@
               <a:buFont typeface="Arial" panose="020B0604020202020204" pitchFamily="34" charset="0"/>
               <a:buNone/>
             </a:pPr>
-            <a:endParaRPr lang="en-GB" altLang="en-US" sz="2000" smtClean="0">
+            <a:endParaRPr lang="en-GB" altLang="en-US" sz="2000">
               <a:latin typeface="Courier New" panose="02070309020205020404" pitchFamily="49" charset="0"/>
               <a:cs typeface="Courier New" panose="02070309020205020404" pitchFamily="49" charset="0"/>
             </a:endParaRPr>
@@ -5971,14 +6597,14 @@
               <a:buNone/>
             </a:pPr>
             <a:r>
-              <a:rPr lang="en-GB" altLang="en-US" sz="2000" b="1" smtClean="0">
+              <a:rPr lang="en-GB" altLang="en-US" sz="2000" b="1">
                 <a:latin typeface="Courier New" panose="02070309020205020404" pitchFamily="49" charset="0"/>
                 <a:cs typeface="Courier New" panose="02070309020205020404" pitchFamily="49" charset="0"/>
               </a:rPr>
               <a:t>def</a:t>
             </a:r>
             <a:r>
-              <a:rPr lang="en-GB" altLang="en-US" sz="2000" smtClean="0">
+              <a:rPr lang="en-GB" altLang="en-US" sz="2000">
                 <a:latin typeface="Courier New" panose="02070309020205020404" pitchFamily="49" charset="0"/>
                 <a:cs typeface="Courier New" panose="02070309020205020404" pitchFamily="49" charset="0"/>
               </a:rPr>
@@ -5991,14 +6617,14 @@
               <a:buNone/>
             </a:pPr>
             <a:r>
-              <a:rPr lang="en-GB" altLang="en-US" sz="2000" smtClean="0">
+              <a:rPr lang="en-GB" altLang="en-US" sz="2000">
                 <a:latin typeface="Courier New" panose="02070309020205020404" pitchFamily="49" charset="0"/>
                 <a:cs typeface="Courier New" panose="02070309020205020404" pitchFamily="49" charset="0"/>
               </a:rPr>
               <a:t>    pdb.set_trace()        </a:t>
             </a:r>
             <a:r>
-              <a:rPr lang="en-GB" altLang="en-US" sz="2000" smtClean="0">
+              <a:rPr lang="en-GB" altLang="en-US" sz="2000">
                 <a:solidFill>
                   <a:srgbClr val="FFC000"/>
                 </a:solidFill>
@@ -6014,7 +6640,7 @@
               <a:buNone/>
             </a:pPr>
             <a:r>
-              <a:rPr lang="en-GB" altLang="en-US" sz="2000" smtClean="0">
+              <a:rPr lang="en-GB" altLang="en-US" sz="2000">
                 <a:latin typeface="Courier New" panose="02070309020205020404" pitchFamily="49" charset="0"/>
                 <a:cs typeface="Courier New" panose="02070309020205020404" pitchFamily="49" charset="0"/>
               </a:rPr>
@@ -6027,21 +6653,21 @@
               <a:buNone/>
             </a:pPr>
             <a:r>
-              <a:rPr lang="en-GB" altLang="en-US" sz="2000" smtClean="0">
+              <a:rPr lang="en-GB" altLang="en-US" sz="2000">
                 <a:latin typeface="Courier New" panose="02070309020205020404" pitchFamily="49" charset="0"/>
                 <a:cs typeface="Courier New" panose="02070309020205020404" pitchFamily="49" charset="0"/>
               </a:rPr>
               <a:t>    </a:t>
             </a:r>
             <a:r>
-              <a:rPr lang="en-GB" altLang="en-US" sz="2000" b="1" smtClean="0">
+              <a:rPr lang="en-GB" altLang="en-US" sz="2000" b="1">
                 <a:latin typeface="Courier New" panose="02070309020205020404" pitchFamily="49" charset="0"/>
                 <a:cs typeface="Courier New" panose="02070309020205020404" pitchFamily="49" charset="0"/>
               </a:rPr>
               <a:t>return</a:t>
             </a:r>
             <a:r>
-              <a:rPr lang="en-GB" altLang="en-US" sz="2000" smtClean="0">
+              <a:rPr lang="en-GB" altLang="en-US" sz="2000">
                 <a:latin typeface="Courier New" panose="02070309020205020404" pitchFamily="49" charset="0"/>
                 <a:cs typeface="Courier New" panose="02070309020205020404" pitchFamily="49" charset="0"/>
               </a:rPr>
@@ -6053,7 +6679,7 @@
               <a:buFont typeface="Arial" panose="020B0604020202020204" pitchFamily="34" charset="0"/>
               <a:buNone/>
             </a:pPr>
-            <a:endParaRPr lang="en-GB" altLang="en-US" sz="1400" smtClean="0">
+            <a:endParaRPr lang="en-GB" altLang="en-US" sz="1400">
               <a:latin typeface="Courier New" panose="02070309020205020404" pitchFamily="49" charset="0"/>
               <a:cs typeface="Courier New" panose="02070309020205020404" pitchFamily="49" charset="0"/>
             </a:endParaRPr>
@@ -6064,7 +6690,7 @@
               <a:buNone/>
             </a:pPr>
             <a:r>
-              <a:rPr lang="en-GB" altLang="en-US" sz="2000" smtClean="0">
+              <a:rPr lang="en-GB" altLang="en-US" sz="2000">
                 <a:solidFill>
                   <a:srgbClr val="FFC000"/>
                 </a:solidFill>
@@ -6080,7 +6706,7 @@
               <a:buNone/>
             </a:pPr>
             <a:r>
-              <a:rPr lang="en-GB" altLang="en-US" sz="2000" smtClean="0">
+              <a:rPr lang="en-GB" altLang="en-US" sz="2000">
                 <a:latin typeface="Courier New" panose="02070309020205020404" pitchFamily="49" charset="0"/>
                 <a:cs typeface="Courier New" panose="02070309020205020404" pitchFamily="49" charset="0"/>
               </a:rPr>
@@ -6093,28 +6719,28 @@
               <a:buNone/>
             </a:pPr>
             <a:r>
-              <a:rPr lang="en-GB" altLang="en-US" sz="2000" b="1" smtClean="0">
+              <a:rPr lang="en-GB" altLang="en-US" sz="2000" b="1">
                 <a:latin typeface="Courier New" panose="02070309020205020404" pitchFamily="49" charset="0"/>
                 <a:cs typeface="Courier New" panose="02070309020205020404" pitchFamily="49" charset="0"/>
               </a:rPr>
               <a:t>for</a:t>
             </a:r>
             <a:r>
-              <a:rPr lang="en-GB" altLang="en-US" sz="2000" smtClean="0">
+              <a:rPr lang="en-GB" altLang="en-US" sz="2000">
                 <a:latin typeface="Courier New" panose="02070309020205020404" pitchFamily="49" charset="0"/>
                 <a:cs typeface="Courier New" panose="02070309020205020404" pitchFamily="49" charset="0"/>
               </a:rPr>
               <a:t> i </a:t>
             </a:r>
             <a:r>
-              <a:rPr lang="en-GB" altLang="en-US" sz="2000" b="1" smtClean="0">
+              <a:rPr lang="en-GB" altLang="en-US" sz="2000" b="1">
                 <a:latin typeface="Courier New" panose="02070309020205020404" pitchFamily="49" charset="0"/>
                 <a:cs typeface="Courier New" panose="02070309020205020404" pitchFamily="49" charset="0"/>
               </a:rPr>
               <a:t>in</a:t>
             </a:r>
             <a:r>
-              <a:rPr lang="en-GB" altLang="en-US" sz="2000" smtClean="0">
+              <a:rPr lang="en-GB" altLang="en-US" sz="2000">
                 <a:latin typeface="Courier New" panose="02070309020205020404" pitchFamily="49" charset="0"/>
                 <a:cs typeface="Courier New" panose="02070309020205020404" pitchFamily="49" charset="0"/>
               </a:rPr>
@@ -6127,21 +6753,21 @@
               <a:buNone/>
             </a:pPr>
             <a:r>
-              <a:rPr lang="en-GB" altLang="en-US" sz="2000" smtClean="0">
+              <a:rPr lang="en-GB" altLang="en-US" sz="2000">
                 <a:latin typeface="Courier New" panose="02070309020205020404" pitchFamily="49" charset="0"/>
                 <a:cs typeface="Courier New" panose="02070309020205020404" pitchFamily="49" charset="0"/>
               </a:rPr>
               <a:t>    </a:t>
             </a:r>
             <a:r>
-              <a:rPr lang="en-GB" altLang="en-US" sz="2000" b="1" smtClean="0">
+              <a:rPr lang="en-GB" altLang="en-US" sz="2000" b="1">
                 <a:latin typeface="Courier New" panose="02070309020205020404" pitchFamily="49" charset="0"/>
                 <a:cs typeface="Courier New" panose="02070309020205020404" pitchFamily="49" charset="0"/>
               </a:rPr>
               <a:t>print</a:t>
             </a:r>
             <a:r>
-              <a:rPr lang="en-GB" altLang="en-US" sz="2000" smtClean="0">
+              <a:rPr lang="en-GB" altLang="en-US" sz="2000">
                 <a:latin typeface="Courier New" panose="02070309020205020404" pitchFamily="49" charset="0"/>
                 <a:cs typeface="Courier New" panose="02070309020205020404" pitchFamily="49" charset="0"/>
               </a:rPr>
@@ -6155,13 +6781,6 @@
   <p:clrMapOvr>
     <a:masterClrMapping/>
   </p:clrMapOvr>
-  <p:timing>
-    <p:tnLst>
-      <p:par>
-        <p:cTn id="1" dur="indefinite" restart="never" nodeType="tmRoot"/>
-      </p:par>
-    </p:tnLst>
-  </p:timing>
 </p:sld>
 </file>
 
@@ -6204,7 +6823,7 @@
           <a:p>
             <a:pPr eaLnBrk="1" hangingPunct="1"/>
             <a:r>
-              <a:rPr lang="en-GB" altLang="en-US" b="1" smtClean="0"/>
+              <a:rPr lang="en-GB" altLang="en-US" b="1"/>
               <a:t>Debugger in action</a:t>
             </a:r>
           </a:p>
@@ -6235,21 +6854,21 @@
               <a:buNone/>
             </a:pPr>
             <a:r>
-              <a:rPr lang="en-GB" altLang="en-US" sz="1800" b="1" dirty="0" smtClean="0">
+              <a:rPr lang="en-GB" altLang="en-US" sz="1800" b="1" dirty="0">
                 <a:latin typeface="Courier New" panose="02070309020205020404" pitchFamily="49" charset="0"/>
                 <a:cs typeface="Courier New" panose="02070309020205020404" pitchFamily="49" charset="0"/>
               </a:rPr>
               <a:t>$</a:t>
             </a:r>
             <a:r>
-              <a:rPr lang="en-GB" altLang="en-US" sz="1800" dirty="0" smtClean="0">
+              <a:rPr lang="en-GB" altLang="en-US" sz="1800" dirty="0">
                 <a:latin typeface="Courier New" panose="02070309020205020404" pitchFamily="49" charset="0"/>
                 <a:cs typeface="Courier New" panose="02070309020205020404" pitchFamily="49" charset="0"/>
               </a:rPr>
               <a:t> </a:t>
             </a:r>
             <a:r>
-              <a:rPr lang="en-GB" altLang="en-US" sz="1800" dirty="0" smtClean="0">
+              <a:rPr lang="en-GB" altLang="en-US" sz="1800" dirty="0">
                 <a:solidFill>
                   <a:srgbClr val="008000"/>
                 </a:solidFill>
@@ -6265,28 +6884,28 @@
               <a:buNone/>
             </a:pPr>
             <a:r>
-              <a:rPr lang="en-US" altLang="en-US" sz="1800" b="1" i="1" dirty="0" smtClean="0">
+              <a:rPr lang="en-US" altLang="en-US" sz="1800" b="1" i="1" dirty="0">
                 <a:latin typeface="Courier New" panose="02070309020205020404" pitchFamily="49" charset="0"/>
                 <a:cs typeface="Courier New" panose="02070309020205020404" pitchFamily="49" charset="0"/>
               </a:rPr>
               <a:t>&gt;</a:t>
             </a:r>
             <a:r>
-              <a:rPr lang="en-US" altLang="en-US" sz="1800" i="1" dirty="0" smtClean="0">
+              <a:rPr lang="en-US" altLang="en-US" sz="1800" i="1" dirty="0">
                 <a:latin typeface="Courier New" panose="02070309020205020404" pitchFamily="49" charset="0"/>
                 <a:cs typeface="Courier New" panose="02070309020205020404" pitchFamily="49" charset="0"/>
               </a:rPr>
               <a:t> /home/vagrant/double.py(5)</a:t>
             </a:r>
             <a:r>
-              <a:rPr lang="en-US" altLang="en-US" sz="1800" i="1" dirty="0" err="1" smtClean="0">
+              <a:rPr lang="en-US" altLang="en-US" sz="1800" i="1" dirty="0" err="1">
                 <a:latin typeface="Courier New" panose="02070309020205020404" pitchFamily="49" charset="0"/>
                 <a:cs typeface="Courier New" panose="02070309020205020404" pitchFamily="49" charset="0"/>
               </a:rPr>
               <a:t>double_it</a:t>
             </a:r>
             <a:r>
-              <a:rPr lang="en-US" altLang="en-US" sz="1800" i="1" dirty="0" smtClean="0">
+              <a:rPr lang="en-US" altLang="en-US" sz="1800" i="1" dirty="0">
                 <a:latin typeface="Courier New" panose="02070309020205020404" pitchFamily="49" charset="0"/>
                 <a:cs typeface="Courier New" panose="02070309020205020404" pitchFamily="49" charset="0"/>
               </a:rPr>
@@ -6299,14 +6918,14 @@
               <a:buNone/>
             </a:pPr>
             <a:r>
-              <a:rPr lang="en-US" altLang="en-US" sz="1800" b="1" i="1" dirty="0" smtClean="0">
+              <a:rPr lang="en-US" altLang="en-US" sz="1800" b="1" i="1" dirty="0">
                 <a:latin typeface="Courier New" panose="02070309020205020404" pitchFamily="49" charset="0"/>
                 <a:cs typeface="Courier New" panose="02070309020205020404" pitchFamily="49" charset="0"/>
               </a:rPr>
               <a:t>-&gt;</a:t>
             </a:r>
             <a:r>
-              <a:rPr lang="en-US" altLang="en-US" sz="1800" i="1" dirty="0" smtClean="0">
+              <a:rPr lang="en-US" altLang="en-US" sz="1800" i="1" dirty="0">
                 <a:latin typeface="Courier New" panose="02070309020205020404" pitchFamily="49" charset="0"/>
                 <a:cs typeface="Courier New" panose="02070309020205020404" pitchFamily="49" charset="0"/>
               </a:rPr>
@@ -6319,28 +6938,28 @@
               <a:buNone/>
             </a:pPr>
             <a:r>
-              <a:rPr lang="en-US" altLang="en-US" sz="1800" b="1" dirty="0" smtClean="0">
+              <a:rPr lang="en-US" altLang="en-US" sz="1800" b="1" dirty="0">
                 <a:latin typeface="Courier New" panose="02070309020205020404" pitchFamily="49" charset="0"/>
                 <a:cs typeface="Courier New" panose="02070309020205020404" pitchFamily="49" charset="0"/>
               </a:rPr>
               <a:t>(</a:t>
             </a:r>
             <a:r>
-              <a:rPr lang="en-US" altLang="en-US" sz="1800" b="1" dirty="0" err="1" smtClean="0">
+              <a:rPr lang="en-US" altLang="en-US" sz="1800" b="1" dirty="0" err="1">
                 <a:latin typeface="Courier New" panose="02070309020205020404" pitchFamily="49" charset="0"/>
                 <a:cs typeface="Courier New" panose="02070309020205020404" pitchFamily="49" charset="0"/>
               </a:rPr>
               <a:t>Pdb</a:t>
             </a:r>
             <a:r>
-              <a:rPr lang="en-US" altLang="en-US" sz="1800" b="1" dirty="0" smtClean="0">
+              <a:rPr lang="en-US" altLang="en-US" sz="1800" b="1" dirty="0">
                 <a:latin typeface="Courier New" panose="02070309020205020404" pitchFamily="49" charset="0"/>
                 <a:cs typeface="Courier New" panose="02070309020205020404" pitchFamily="49" charset="0"/>
               </a:rPr>
               <a:t>) </a:t>
             </a:r>
             <a:r>
-              <a:rPr lang="en-US" altLang="en-US" sz="1800" dirty="0" smtClean="0">
+              <a:rPr lang="en-US" altLang="en-US" sz="1800" dirty="0">
                 <a:solidFill>
                   <a:srgbClr val="008000"/>
                 </a:solidFill>
@@ -6350,7 +6969,7 @@
               <a:t>n</a:t>
             </a:r>
             <a:r>
-              <a:rPr lang="en-GB" altLang="en-US" sz="1800" b="1" dirty="0" smtClean="0">
+              <a:rPr lang="en-GB" altLang="en-US" sz="1800" b="1" dirty="0">
                 <a:solidFill>
                   <a:srgbClr val="008000"/>
                 </a:solidFill>
@@ -6360,19 +6979,19 @@
               <a:t>  </a:t>
             </a:r>
             <a:r>
-              <a:rPr lang="en-GB" altLang="en-US" sz="1800" b="1" dirty="0" smtClean="0">
+              <a:rPr lang="en-GB" altLang="en-US" sz="1800" b="1" dirty="0">
                 <a:latin typeface="Courier New" panose="02070309020205020404" pitchFamily="49" charset="0"/>
                 <a:cs typeface="Courier New" panose="02070309020205020404" pitchFamily="49" charset="0"/>
               </a:rPr>
               <a:t>   		</a:t>
             </a:r>
             <a:r>
-              <a:rPr lang="en-GB" altLang="en-US" sz="2000" b="1" dirty="0" smtClean="0">
+              <a:rPr lang="en-GB" altLang="en-US" sz="2000" b="1" dirty="0">
                 <a:cs typeface="Courier New" panose="02070309020205020404" pitchFamily="49" charset="0"/>
               </a:rPr>
               <a:t>Run the next line of code</a:t>
             </a:r>
-            <a:endParaRPr lang="en-GB" altLang="en-US" sz="1800" b="1" dirty="0" smtClean="0">
+            <a:endParaRPr lang="en-GB" altLang="en-US" sz="1800" b="1" dirty="0">
               <a:cs typeface="Courier New" panose="02070309020205020404" pitchFamily="49" charset="0"/>
             </a:endParaRPr>
           </a:p>
@@ -6382,56 +7001,56 @@
               <a:buNone/>
             </a:pPr>
             <a:r>
-              <a:rPr lang="en-GB" altLang="en-US" sz="1800" b="1" i="1" dirty="0" smtClean="0">
+              <a:rPr lang="en-GB" altLang="en-US" sz="1800" b="1" i="1" dirty="0">
                 <a:latin typeface="Courier New" panose="02070309020205020404" pitchFamily="49" charset="0"/>
                 <a:cs typeface="Courier New" panose="02070309020205020404" pitchFamily="49" charset="0"/>
               </a:rPr>
               <a:t>&gt;</a:t>
             </a:r>
             <a:r>
-              <a:rPr lang="en-GB" altLang="en-US" sz="1800" i="1" dirty="0" smtClean="0">
+              <a:rPr lang="en-GB" altLang="en-US" sz="1800" i="1" dirty="0">
                 <a:latin typeface="Courier New" panose="02070309020205020404" pitchFamily="49" charset="0"/>
                 <a:cs typeface="Courier New" panose="02070309020205020404" pitchFamily="49" charset="0"/>
               </a:rPr>
               <a:t> /home/vagrant/</a:t>
             </a:r>
             <a:r>
-              <a:rPr lang="en-US" altLang="en-US" sz="1800" i="1" dirty="0" smtClean="0">
+              <a:rPr lang="en-US" altLang="en-US" sz="1800" i="1" dirty="0">
                 <a:latin typeface="Courier New" panose="02070309020205020404" pitchFamily="49" charset="0"/>
                 <a:cs typeface="Courier New" panose="02070309020205020404" pitchFamily="49" charset="0"/>
               </a:rPr>
               <a:t>double</a:t>
             </a:r>
             <a:r>
-              <a:rPr lang="en-GB" altLang="en-US" sz="1800" i="1" dirty="0" smtClean="0">
+              <a:rPr lang="en-GB" altLang="en-US" sz="1800" i="1" dirty="0">
                 <a:latin typeface="Courier New" panose="02070309020205020404" pitchFamily="49" charset="0"/>
                 <a:cs typeface="Courier New" panose="02070309020205020404" pitchFamily="49" charset="0"/>
               </a:rPr>
               <a:t>.</a:t>
             </a:r>
             <a:r>
-              <a:rPr lang="en-GB" altLang="en-US" sz="1800" i="1" dirty="0" err="1" smtClean="0">
+              <a:rPr lang="en-GB" altLang="en-US" sz="1800" i="1" dirty="0" err="1">
                 <a:latin typeface="Courier New" panose="02070309020205020404" pitchFamily="49" charset="0"/>
                 <a:cs typeface="Courier New" panose="02070309020205020404" pitchFamily="49" charset="0"/>
               </a:rPr>
               <a:t>py</a:t>
             </a:r>
             <a:r>
-              <a:rPr lang="en-GB" altLang="en-US" sz="1800" i="1" dirty="0" smtClean="0">
+              <a:rPr lang="en-GB" altLang="en-US" sz="1800" i="1" dirty="0">
                 <a:latin typeface="Courier New" panose="02070309020205020404" pitchFamily="49" charset="0"/>
                 <a:cs typeface="Courier New" panose="02070309020205020404" pitchFamily="49" charset="0"/>
               </a:rPr>
               <a:t>(6)</a:t>
             </a:r>
             <a:r>
-              <a:rPr lang="en-GB" altLang="en-US" sz="1800" i="1" dirty="0" err="1" smtClean="0">
+              <a:rPr lang="en-GB" altLang="en-US" sz="1800" i="1" dirty="0" err="1">
                 <a:latin typeface="Courier New" panose="02070309020205020404" pitchFamily="49" charset="0"/>
                 <a:cs typeface="Courier New" panose="02070309020205020404" pitchFamily="49" charset="0"/>
               </a:rPr>
               <a:t>double_it</a:t>
             </a:r>
             <a:r>
-              <a:rPr lang="en-GB" altLang="en-US" sz="1800" i="1" dirty="0" smtClean="0">
+              <a:rPr lang="en-GB" altLang="en-US" sz="1800" i="1" dirty="0">
                 <a:latin typeface="Courier New" panose="02070309020205020404" pitchFamily="49" charset="0"/>
                 <a:cs typeface="Courier New" panose="02070309020205020404" pitchFamily="49" charset="0"/>
               </a:rPr>
@@ -6444,14 +7063,14 @@
               <a:buNone/>
             </a:pPr>
             <a:r>
-              <a:rPr lang="en-GB" altLang="en-US" sz="1800" b="1" i="1" dirty="0" smtClean="0">
+              <a:rPr lang="en-GB" altLang="en-US" sz="1800" b="1" i="1" dirty="0">
                 <a:latin typeface="Courier New" panose="02070309020205020404" pitchFamily="49" charset="0"/>
                 <a:cs typeface="Courier New" panose="02070309020205020404" pitchFamily="49" charset="0"/>
               </a:rPr>
               <a:t>-&gt;</a:t>
             </a:r>
             <a:r>
-              <a:rPr lang="en-GB" altLang="en-US" sz="1800" i="1" dirty="0" smtClean="0">
+              <a:rPr lang="en-GB" altLang="en-US" sz="1800" i="1" dirty="0">
                 <a:latin typeface="Courier New" panose="02070309020205020404" pitchFamily="49" charset="0"/>
                 <a:cs typeface="Courier New" panose="02070309020205020404" pitchFamily="49" charset="0"/>
               </a:rPr>
@@ -6464,28 +7083,28 @@
               <a:buNone/>
             </a:pPr>
             <a:r>
-              <a:rPr lang="en-GB" altLang="en-US" sz="1800" b="1" dirty="0" smtClean="0">
+              <a:rPr lang="en-GB" altLang="en-US" sz="1800" b="1" dirty="0">
                 <a:latin typeface="Courier New" panose="02070309020205020404" pitchFamily="49" charset="0"/>
                 <a:cs typeface="Courier New" panose="02070309020205020404" pitchFamily="49" charset="0"/>
               </a:rPr>
               <a:t>(</a:t>
             </a:r>
             <a:r>
-              <a:rPr lang="en-GB" altLang="en-US" sz="1800" b="1" dirty="0" err="1" smtClean="0">
+              <a:rPr lang="en-GB" altLang="en-US" sz="1800" b="1" dirty="0" err="1">
                 <a:latin typeface="Courier New" panose="02070309020205020404" pitchFamily="49" charset="0"/>
                 <a:cs typeface="Courier New" panose="02070309020205020404" pitchFamily="49" charset="0"/>
               </a:rPr>
               <a:t>Pdb</a:t>
             </a:r>
             <a:r>
-              <a:rPr lang="en-GB" altLang="en-US" sz="1800" b="1" dirty="0" smtClean="0">
+              <a:rPr lang="en-GB" altLang="en-US" sz="1800" b="1" dirty="0">
                 <a:latin typeface="Courier New" panose="02070309020205020404" pitchFamily="49" charset="0"/>
                 <a:cs typeface="Courier New" panose="02070309020205020404" pitchFamily="49" charset="0"/>
               </a:rPr>
               <a:t>) </a:t>
             </a:r>
             <a:r>
-              <a:rPr lang="en-GB" altLang="en-US" sz="1800" dirty="0" smtClean="0">
+              <a:rPr lang="en-GB" altLang="en-US" sz="1800" dirty="0">
                 <a:solidFill>
                   <a:srgbClr val="008000"/>
                 </a:solidFill>
@@ -6495,14 +7114,14 @@
               <a:t>print(double, x)   </a:t>
             </a:r>
             <a:r>
-              <a:rPr lang="en-GB" altLang="en-US" sz="1800" dirty="0" smtClean="0">
+              <a:rPr lang="en-GB" altLang="en-US" sz="1800" dirty="0">
                 <a:latin typeface="Courier New" panose="02070309020205020404" pitchFamily="49" charset="0"/>
                 <a:cs typeface="Courier New" panose="02070309020205020404" pitchFamily="49" charset="0"/>
               </a:rPr>
               <a:t>	</a:t>
             </a:r>
             <a:r>
-              <a:rPr lang="en-GB" altLang="en-US" sz="2000" b="1" dirty="0" smtClean="0">
+              <a:rPr lang="en-GB" altLang="en-US" sz="2000" b="1" dirty="0">
                 <a:cs typeface="Courier New" panose="02070309020205020404" pitchFamily="49" charset="0"/>
               </a:rPr>
               <a:t>Display current values of double and x</a:t>
@@ -6514,7 +7133,7 @@
               <a:buNone/>
             </a:pPr>
             <a:r>
-              <a:rPr lang="en-GB" altLang="en-US" sz="1800" i="1" dirty="0" smtClean="0">
+              <a:rPr lang="en-GB" altLang="en-US" sz="1800" i="1" dirty="0">
                 <a:latin typeface="Courier New" panose="02070309020205020404" pitchFamily="49" charset="0"/>
                 <a:cs typeface="Courier New" panose="02070309020205020404" pitchFamily="49" charset="0"/>
               </a:rPr>
@@ -6526,7 +7145,7 @@
               <a:buFont typeface="Arial" panose="020B0604020202020204" pitchFamily="34" charset="0"/>
               <a:buNone/>
             </a:pPr>
-            <a:endParaRPr lang="en-GB" altLang="en-US" sz="900" dirty="0" smtClean="0">
+            <a:endParaRPr lang="en-GB" altLang="en-US" sz="900" dirty="0">
               <a:latin typeface="Courier New" panose="02070309020205020404" pitchFamily="49" charset="0"/>
               <a:cs typeface="Courier New" panose="02070309020205020404" pitchFamily="49" charset="0"/>
             </a:endParaRPr>
@@ -6537,28 +7156,28 @@
               <a:buNone/>
             </a:pPr>
             <a:r>
-              <a:rPr lang="en-GB" altLang="en-US" sz="1800" b="1" dirty="0" smtClean="0">
+              <a:rPr lang="en-GB" altLang="en-US" sz="1800" b="1" dirty="0">
                 <a:latin typeface="Courier New" panose="02070309020205020404" pitchFamily="49" charset="0"/>
                 <a:cs typeface="Courier New" panose="02070309020205020404" pitchFamily="49" charset="0"/>
               </a:rPr>
               <a:t>(</a:t>
             </a:r>
             <a:r>
-              <a:rPr lang="en-GB" altLang="en-US" sz="1800" b="1" dirty="0" err="1" smtClean="0">
+              <a:rPr lang="en-GB" altLang="en-US" sz="1800" b="1" dirty="0" err="1">
                 <a:latin typeface="Courier New" panose="02070309020205020404" pitchFamily="49" charset="0"/>
                 <a:cs typeface="Courier New" panose="02070309020205020404" pitchFamily="49" charset="0"/>
               </a:rPr>
               <a:t>Pdb</a:t>
             </a:r>
             <a:r>
-              <a:rPr lang="en-GB" altLang="en-US" sz="1800" b="1" dirty="0" smtClean="0">
+              <a:rPr lang="en-GB" altLang="en-US" sz="1800" b="1" dirty="0">
                 <a:latin typeface="Courier New" panose="02070309020205020404" pitchFamily="49" charset="0"/>
                 <a:cs typeface="Courier New" panose="02070309020205020404" pitchFamily="49" charset="0"/>
               </a:rPr>
               <a:t>) </a:t>
             </a:r>
             <a:r>
-              <a:rPr lang="en-GB" altLang="en-US" sz="1800" dirty="0" smtClean="0">
+              <a:rPr lang="en-GB" altLang="en-US" sz="1800" dirty="0">
                 <a:solidFill>
                   <a:srgbClr val="008000"/>
                 </a:solidFill>
@@ -6568,14 +7187,14 @@
               <a:t>n </a:t>
             </a:r>
             <a:r>
-              <a:rPr lang="en-GB" altLang="en-US" sz="1800" dirty="0" smtClean="0">
+              <a:rPr lang="en-GB" altLang="en-US" sz="1800" dirty="0">
                 <a:latin typeface="Courier New" panose="02070309020205020404" pitchFamily="49" charset="0"/>
                 <a:cs typeface="Courier New" panose="02070309020205020404" pitchFamily="49" charset="0"/>
               </a:rPr>
               <a:t>    		</a:t>
             </a:r>
             <a:r>
-              <a:rPr lang="en-GB" altLang="en-US" sz="2000" b="1" dirty="0" smtClean="0">
+              <a:rPr lang="en-GB" altLang="en-US" sz="2000" b="1" dirty="0">
                 <a:cs typeface="Courier New" panose="02070309020205020404" pitchFamily="49" charset="0"/>
               </a:rPr>
               <a:t>Run the next line of code</a:t>
@@ -6587,7 +7206,7 @@
               <a:buNone/>
             </a:pPr>
             <a:r>
-              <a:rPr lang="en-US" altLang="en-US" sz="1800" i="1" dirty="0" smtClean="0">
+              <a:rPr lang="en-US" altLang="en-US" sz="1800" i="1" dirty="0">
                 <a:latin typeface="Courier New" panose="02070309020205020404" pitchFamily="49" charset="0"/>
                 <a:cs typeface="Courier New" panose="02070309020205020404" pitchFamily="49" charset="0"/>
               </a:rPr>
@@ -6600,28 +7219,28 @@
               <a:buNone/>
             </a:pPr>
             <a:r>
-              <a:rPr lang="en-US" altLang="en-US" sz="1800" b="1" i="1" dirty="0" smtClean="0">
+              <a:rPr lang="en-US" altLang="en-US" sz="1800" b="1" i="1" dirty="0">
                 <a:latin typeface="Courier New" panose="02070309020205020404" pitchFamily="49" charset="0"/>
                 <a:cs typeface="Courier New" panose="02070309020205020404" pitchFamily="49" charset="0"/>
               </a:rPr>
               <a:t>&gt;</a:t>
             </a:r>
             <a:r>
-              <a:rPr lang="en-US" altLang="en-US" sz="1800" i="1" dirty="0" smtClean="0">
+              <a:rPr lang="en-US" altLang="en-US" sz="1800" i="1" dirty="0">
                 <a:latin typeface="Courier New" panose="02070309020205020404" pitchFamily="49" charset="0"/>
                 <a:cs typeface="Courier New" panose="02070309020205020404" pitchFamily="49" charset="0"/>
               </a:rPr>
               <a:t> /home/vagrant/double.py(6)</a:t>
             </a:r>
             <a:r>
-              <a:rPr lang="en-US" altLang="en-US" sz="1800" i="1" dirty="0" err="1" smtClean="0">
+              <a:rPr lang="en-US" altLang="en-US" sz="1800" i="1" dirty="0" err="1">
                 <a:latin typeface="Courier New" panose="02070309020205020404" pitchFamily="49" charset="0"/>
                 <a:cs typeface="Courier New" panose="02070309020205020404" pitchFamily="49" charset="0"/>
               </a:rPr>
               <a:t>double_it</a:t>
             </a:r>
             <a:r>
-              <a:rPr lang="en-US" altLang="en-US" sz="1800" i="1" dirty="0" smtClean="0">
+              <a:rPr lang="en-US" altLang="en-US" sz="1800" i="1" dirty="0">
                 <a:latin typeface="Courier New" panose="02070309020205020404" pitchFamily="49" charset="0"/>
                 <a:cs typeface="Courier New" panose="02070309020205020404" pitchFamily="49" charset="0"/>
               </a:rPr>
@@ -6634,20 +7253,20 @@
               <a:buNone/>
             </a:pPr>
             <a:r>
-              <a:rPr lang="en-US" altLang="en-US" sz="1800" b="1" i="1" dirty="0" smtClean="0">
+              <a:rPr lang="en-US" altLang="en-US" sz="1800" b="1" i="1" dirty="0">
                 <a:latin typeface="Courier New" panose="02070309020205020404" pitchFamily="49" charset="0"/>
                 <a:cs typeface="Courier New" panose="02070309020205020404" pitchFamily="49" charset="0"/>
               </a:rPr>
               <a:t>-&gt;</a:t>
             </a:r>
             <a:r>
-              <a:rPr lang="en-US" altLang="en-US" sz="1800" i="1" dirty="0" smtClean="0">
+              <a:rPr lang="en-US" altLang="en-US" sz="1800" i="1" dirty="0">
                 <a:latin typeface="Courier New" panose="02070309020205020404" pitchFamily="49" charset="0"/>
                 <a:cs typeface="Courier New" panose="02070309020205020404" pitchFamily="49" charset="0"/>
               </a:rPr>
               <a:t> return double</a:t>
             </a:r>
-            <a:endParaRPr lang="en-GB" altLang="en-US" sz="1800" i="1" dirty="0" smtClean="0">
+            <a:endParaRPr lang="en-GB" altLang="en-US" sz="1800" i="1" dirty="0">
               <a:latin typeface="Courier New" panose="02070309020205020404" pitchFamily="49" charset="0"/>
               <a:cs typeface="Courier New" panose="02070309020205020404" pitchFamily="49" charset="0"/>
             </a:endParaRPr>

</xml_diff>